<commit_message>
modified for 2D simulation
</commit_message>
<xml_diff>
--- a/preject.pptx
+++ b/preject.pptx
@@ -7,6 +7,10 @@
   <p:sldIdLst>
     <p:sldId id="256" r:id="rId2"/>
     <p:sldId id="257" r:id="rId3"/>
+    <p:sldId id="258" r:id="rId4"/>
+    <p:sldId id="260" r:id="rId5"/>
+    <p:sldId id="259" r:id="rId6"/>
+    <p:sldId id="261" r:id="rId7"/>
   </p:sldIdLst>
   <p:sldSz cx="12192000" cy="6858000"/>
   <p:notesSz cx="6858000" cy="9144000"/>
@@ -4427,6 +4431,715 @@
 </p:sld>
 </file>
 
+<file path=ppt/slides/slide3.xml><?xml version="1.0" encoding="utf-8"?>
+<p:sld xmlns:a="http://schemas.openxmlformats.org/drawingml/2006/main" xmlns:r="http://schemas.openxmlformats.org/officeDocument/2006/relationships" xmlns:p="http://schemas.openxmlformats.org/presentationml/2006/main">
+  <p:cSld>
+    <p:spTree>
+      <p:nvGrpSpPr>
+        <p:cNvPr id="1" name=""/>
+        <p:cNvGrpSpPr/>
+        <p:nvPr/>
+      </p:nvGrpSpPr>
+      <p:grpSpPr>
+        <a:xfrm>
+          <a:off x="0" y="0"/>
+          <a:ext cx="0" cy="0"/>
+          <a:chOff x="0" y="0"/>
+          <a:chExt cx="0" cy="0"/>
+        </a:xfrm>
+      </p:grpSpPr>
+      <p:pic>
+        <p:nvPicPr>
+          <p:cNvPr id="4" name="Picture 3">
+            <a:extLst>
+              <a:ext uri="{FF2B5EF4-FFF2-40B4-BE49-F238E27FC236}">
+                <a16:creationId xmlns:a16="http://schemas.microsoft.com/office/drawing/2014/main" id="{2E519EC8-71CA-D840-9C30-63E2D2BFF5E8}"/>
+              </a:ext>
+            </a:extLst>
+          </p:cNvPr>
+          <p:cNvPicPr>
+            <a:picLocks noChangeAspect="1"/>
+          </p:cNvPicPr>
+          <p:nvPr/>
+        </p:nvPicPr>
+        <p:blipFill>
+          <a:blip r:embed="rId2"/>
+          <a:stretch>
+            <a:fillRect/>
+          </a:stretch>
+        </p:blipFill>
+        <p:spPr>
+          <a:xfrm>
+            <a:off x="3626187" y="469371"/>
+            <a:ext cx="3480476" cy="3425880"/>
+          </a:xfrm>
+          <a:prstGeom prst="rect">
+            <a:avLst/>
+          </a:prstGeom>
+        </p:spPr>
+      </p:pic>
+      <p:pic>
+        <p:nvPicPr>
+          <p:cNvPr id="6" name="Picture 5">
+            <a:extLst>
+              <a:ext uri="{FF2B5EF4-FFF2-40B4-BE49-F238E27FC236}">
+                <a16:creationId xmlns:a16="http://schemas.microsoft.com/office/drawing/2014/main" id="{D9617095-DF6A-4F41-95B9-4D08FB0B98D7}"/>
+              </a:ext>
+            </a:extLst>
+          </p:cNvPr>
+          <p:cNvPicPr>
+            <a:picLocks noChangeAspect="1"/>
+          </p:cNvPicPr>
+          <p:nvPr/>
+        </p:nvPicPr>
+        <p:blipFill>
+          <a:blip r:embed="rId3"/>
+          <a:stretch>
+            <a:fillRect/>
+          </a:stretch>
+        </p:blipFill>
+        <p:spPr>
+          <a:xfrm>
+            <a:off x="423693" y="4102629"/>
+            <a:ext cx="2336800" cy="2286000"/>
+          </a:xfrm>
+          <a:prstGeom prst="rect">
+            <a:avLst/>
+          </a:prstGeom>
+        </p:spPr>
+      </p:pic>
+      <p:pic>
+        <p:nvPicPr>
+          <p:cNvPr id="8" name="Picture 7">
+            <a:extLst>
+              <a:ext uri="{FF2B5EF4-FFF2-40B4-BE49-F238E27FC236}">
+                <a16:creationId xmlns:a16="http://schemas.microsoft.com/office/drawing/2014/main" id="{7B83E342-28D1-5041-9FFB-DB28E5DEDC63}"/>
+              </a:ext>
+            </a:extLst>
+          </p:cNvPr>
+          <p:cNvPicPr>
+            <a:picLocks noChangeAspect="1"/>
+          </p:cNvPicPr>
+          <p:nvPr/>
+        </p:nvPicPr>
+        <p:blipFill>
+          <a:blip r:embed="rId4"/>
+          <a:stretch>
+            <a:fillRect/>
+          </a:stretch>
+        </p:blipFill>
+        <p:spPr>
+          <a:xfrm>
+            <a:off x="2994363" y="4140729"/>
+            <a:ext cx="2273300" cy="2247900"/>
+          </a:xfrm>
+          <a:prstGeom prst="rect">
+            <a:avLst/>
+          </a:prstGeom>
+        </p:spPr>
+      </p:pic>
+      <p:pic>
+        <p:nvPicPr>
+          <p:cNvPr id="10" name="Picture 9">
+            <a:extLst>
+              <a:ext uri="{FF2B5EF4-FFF2-40B4-BE49-F238E27FC236}">
+                <a16:creationId xmlns:a16="http://schemas.microsoft.com/office/drawing/2014/main" id="{3ABDFB73-9D98-2C49-AF28-E43A27455F48}"/>
+              </a:ext>
+            </a:extLst>
+          </p:cNvPr>
+          <p:cNvPicPr>
+            <a:picLocks noChangeAspect="1"/>
+          </p:cNvPicPr>
+          <p:nvPr/>
+        </p:nvPicPr>
+        <p:blipFill>
+          <a:blip r:embed="rId5"/>
+          <a:stretch>
+            <a:fillRect/>
+          </a:stretch>
+        </p:blipFill>
+        <p:spPr>
+          <a:xfrm>
+            <a:off x="5501533" y="4140729"/>
+            <a:ext cx="2273300" cy="2247900"/>
+          </a:xfrm>
+          <a:prstGeom prst="rect">
+            <a:avLst/>
+          </a:prstGeom>
+        </p:spPr>
+      </p:pic>
+      <p:pic>
+        <p:nvPicPr>
+          <p:cNvPr id="12" name="Picture 11">
+            <a:extLst>
+              <a:ext uri="{FF2B5EF4-FFF2-40B4-BE49-F238E27FC236}">
+                <a16:creationId xmlns:a16="http://schemas.microsoft.com/office/drawing/2014/main" id="{C8371C20-AA68-3C4A-9D4C-8FFC158C50C7}"/>
+              </a:ext>
+            </a:extLst>
+          </p:cNvPr>
+          <p:cNvPicPr>
+            <a:picLocks noChangeAspect="1"/>
+          </p:cNvPicPr>
+          <p:nvPr/>
+        </p:nvPicPr>
+        <p:blipFill>
+          <a:blip r:embed="rId6"/>
+          <a:stretch>
+            <a:fillRect/>
+          </a:stretch>
+        </p:blipFill>
+        <p:spPr>
+          <a:xfrm>
+            <a:off x="8008703" y="4140729"/>
+            <a:ext cx="2247900" cy="2247900"/>
+          </a:xfrm>
+          <a:prstGeom prst="rect">
+            <a:avLst/>
+          </a:prstGeom>
+        </p:spPr>
+      </p:pic>
+    </p:spTree>
+    <p:extLst>
+      <p:ext uri="{BB962C8B-B14F-4D97-AF65-F5344CB8AC3E}">
+        <p14:creationId xmlns:p14="http://schemas.microsoft.com/office/powerpoint/2010/main" val="1358721396"/>
+      </p:ext>
+    </p:extLst>
+  </p:cSld>
+  <p:clrMapOvr>
+    <a:masterClrMapping/>
+  </p:clrMapOvr>
+</p:sld>
+</file>
+
+<file path=ppt/slides/slide4.xml><?xml version="1.0" encoding="utf-8"?>
+<p:sld xmlns:a="http://schemas.openxmlformats.org/drawingml/2006/main" xmlns:r="http://schemas.openxmlformats.org/officeDocument/2006/relationships" xmlns:p="http://schemas.openxmlformats.org/presentationml/2006/main">
+  <p:cSld>
+    <p:spTree>
+      <p:nvGrpSpPr>
+        <p:cNvPr id="1" name=""/>
+        <p:cNvGrpSpPr/>
+        <p:nvPr/>
+      </p:nvGrpSpPr>
+      <p:grpSpPr>
+        <a:xfrm>
+          <a:off x="0" y="0"/>
+          <a:ext cx="0" cy="0"/>
+          <a:chOff x="0" y="0"/>
+          <a:chExt cx="0" cy="0"/>
+        </a:xfrm>
+      </p:grpSpPr>
+      <p:pic>
+        <p:nvPicPr>
+          <p:cNvPr id="3" name="Picture 2">
+            <a:extLst>
+              <a:ext uri="{FF2B5EF4-FFF2-40B4-BE49-F238E27FC236}">
+                <a16:creationId xmlns:a16="http://schemas.microsoft.com/office/drawing/2014/main" id="{041C70E5-B258-C540-8E1C-1357F56956E4}"/>
+              </a:ext>
+            </a:extLst>
+          </p:cNvPr>
+          <p:cNvPicPr>
+            <a:picLocks noChangeAspect="1"/>
+          </p:cNvPicPr>
+          <p:nvPr/>
+        </p:nvPicPr>
+        <p:blipFill>
+          <a:blip r:embed="rId2"/>
+          <a:stretch>
+            <a:fillRect/>
+          </a:stretch>
+        </p:blipFill>
+        <p:spPr>
+          <a:xfrm>
+            <a:off x="1358630" y="598251"/>
+            <a:ext cx="2743200" cy="2743200"/>
+          </a:xfrm>
+          <a:prstGeom prst="rect">
+            <a:avLst/>
+          </a:prstGeom>
+        </p:spPr>
+      </p:pic>
+      <p:pic>
+        <p:nvPicPr>
+          <p:cNvPr id="7" name="Picture 6">
+            <a:extLst>
+              <a:ext uri="{FF2B5EF4-FFF2-40B4-BE49-F238E27FC236}">
+                <a16:creationId xmlns:a16="http://schemas.microsoft.com/office/drawing/2014/main" id="{B1185DED-08BA-FE4D-88F8-3B98084DA5A3}"/>
+              </a:ext>
+            </a:extLst>
+          </p:cNvPr>
+          <p:cNvPicPr>
+            <a:picLocks noChangeAspect="1"/>
+          </p:cNvPicPr>
+          <p:nvPr/>
+        </p:nvPicPr>
+        <p:blipFill>
+          <a:blip r:embed="rId3"/>
+          <a:stretch>
+            <a:fillRect/>
+          </a:stretch>
+        </p:blipFill>
+        <p:spPr>
+          <a:xfrm>
+            <a:off x="6874212" y="598251"/>
+            <a:ext cx="2743200" cy="2743200"/>
+          </a:xfrm>
+          <a:prstGeom prst="rect">
+            <a:avLst/>
+          </a:prstGeom>
+        </p:spPr>
+      </p:pic>
+      <p:pic>
+        <p:nvPicPr>
+          <p:cNvPr id="11" name="Picture 10">
+            <a:extLst>
+              <a:ext uri="{FF2B5EF4-FFF2-40B4-BE49-F238E27FC236}">
+                <a16:creationId xmlns:a16="http://schemas.microsoft.com/office/drawing/2014/main" id="{C327F4C0-73E3-C14C-9B0D-EBB396FC02EE}"/>
+              </a:ext>
+            </a:extLst>
+          </p:cNvPr>
+          <p:cNvPicPr>
+            <a:picLocks noChangeAspect="1"/>
+          </p:cNvPicPr>
+          <p:nvPr/>
+        </p:nvPicPr>
+        <p:blipFill>
+          <a:blip r:embed="rId4"/>
+          <a:stretch>
+            <a:fillRect/>
+          </a:stretch>
+        </p:blipFill>
+        <p:spPr>
+          <a:xfrm>
+            <a:off x="3615448" y="3769468"/>
+            <a:ext cx="2743200" cy="2767370"/>
+          </a:xfrm>
+          <a:prstGeom prst="rect">
+            <a:avLst/>
+          </a:prstGeom>
+        </p:spPr>
+      </p:pic>
+      <p:sp>
+        <p:nvSpPr>
+          <p:cNvPr id="2" name="TextBox 1">
+            <a:extLst>
+              <a:ext uri="{FF2B5EF4-FFF2-40B4-BE49-F238E27FC236}">
+                <a16:creationId xmlns:a16="http://schemas.microsoft.com/office/drawing/2014/main" id="{42629754-2095-1248-B5E3-9333334D0C08}"/>
+              </a:ext>
+            </a:extLst>
+          </p:cNvPr>
+          <p:cNvSpPr txBox="1"/>
+          <p:nvPr/>
+        </p:nvSpPr>
+        <p:spPr>
+          <a:xfrm>
+            <a:off x="496111" y="301558"/>
+            <a:ext cx="1101199" cy="369332"/>
+          </a:xfrm>
+          <a:prstGeom prst="rect">
+            <a:avLst/>
+          </a:prstGeom>
+          <a:noFill/>
+        </p:spPr>
+        <p:txBody>
+          <a:bodyPr wrap="none" rtlCol="0">
+            <a:spAutoFit/>
+          </a:bodyPr>
+          <a:lstStyle/>
+          <a:p>
+            <a:r>
+              <a:rPr lang="en-US" dirty="0"/>
+              <a:t>Binarized </a:t>
+            </a:r>
+          </a:p>
+        </p:txBody>
+      </p:sp>
+      <p:sp>
+        <p:nvSpPr>
+          <p:cNvPr id="4" name="TextBox 3">
+            <a:extLst>
+              <a:ext uri="{FF2B5EF4-FFF2-40B4-BE49-F238E27FC236}">
+                <a16:creationId xmlns:a16="http://schemas.microsoft.com/office/drawing/2014/main" id="{62CC6AB0-6FC9-C742-BCEA-0FF8A995BAE9}"/>
+              </a:ext>
+            </a:extLst>
+          </p:cNvPr>
+          <p:cNvSpPr txBox="1"/>
+          <p:nvPr/>
+        </p:nvSpPr>
+        <p:spPr>
+          <a:xfrm>
+            <a:off x="1046710" y="4163438"/>
+            <a:ext cx="2462725" cy="369332"/>
+          </a:xfrm>
+          <a:prstGeom prst="rect">
+            <a:avLst/>
+          </a:prstGeom>
+          <a:noFill/>
+        </p:spPr>
+        <p:txBody>
+          <a:bodyPr wrap="none" rtlCol="0">
+            <a:spAutoFit/>
+          </a:bodyPr>
+          <a:lstStyle/>
+          <a:p>
+            <a:r>
+              <a:rPr lang="en-US" dirty="0" err="1"/>
+              <a:t>Downsampled</a:t>
+            </a:r>
+            <a:r>
+              <a:rPr lang="en-US" dirty="0"/>
+              <a:t> and crop </a:t>
+            </a:r>
+          </a:p>
+        </p:txBody>
+      </p:sp>
+    </p:spTree>
+    <p:extLst>
+      <p:ext uri="{BB962C8B-B14F-4D97-AF65-F5344CB8AC3E}">
+        <p14:creationId xmlns:p14="http://schemas.microsoft.com/office/powerpoint/2010/main" val="968249077"/>
+      </p:ext>
+    </p:extLst>
+  </p:cSld>
+  <p:clrMapOvr>
+    <a:masterClrMapping/>
+  </p:clrMapOvr>
+</p:sld>
+</file>
+
+<file path=ppt/slides/slide5.xml><?xml version="1.0" encoding="utf-8"?>
+<p:sld xmlns:a="http://schemas.openxmlformats.org/drawingml/2006/main" xmlns:r="http://schemas.openxmlformats.org/officeDocument/2006/relationships" xmlns:p="http://schemas.openxmlformats.org/presentationml/2006/main">
+  <p:cSld>
+    <p:spTree>
+      <p:nvGrpSpPr>
+        <p:cNvPr id="1" name=""/>
+        <p:cNvGrpSpPr/>
+        <p:nvPr/>
+      </p:nvGrpSpPr>
+      <p:grpSpPr>
+        <a:xfrm>
+          <a:off x="0" y="0"/>
+          <a:ext cx="0" cy="0"/>
+          <a:chOff x="0" y="0"/>
+          <a:chExt cx="0" cy="0"/>
+        </a:xfrm>
+      </p:grpSpPr>
+      <p:pic>
+        <p:nvPicPr>
+          <p:cNvPr id="14" name="Picture 13">
+            <a:extLst>
+              <a:ext uri="{FF2B5EF4-FFF2-40B4-BE49-F238E27FC236}">
+                <a16:creationId xmlns:a16="http://schemas.microsoft.com/office/drawing/2014/main" id="{7A2230B4-E188-9848-B9F7-A740F72B3BBD}"/>
+              </a:ext>
+            </a:extLst>
+          </p:cNvPr>
+          <p:cNvPicPr>
+            <a:picLocks noChangeAspect="1"/>
+          </p:cNvPicPr>
+          <p:nvPr/>
+        </p:nvPicPr>
+        <p:blipFill>
+          <a:blip r:embed="rId2"/>
+          <a:stretch>
+            <a:fillRect/>
+          </a:stretch>
+        </p:blipFill>
+        <p:spPr>
+          <a:xfrm>
+            <a:off x="529414" y="897444"/>
+            <a:ext cx="3410289" cy="3410289"/>
+          </a:xfrm>
+          <a:prstGeom prst="rect">
+            <a:avLst/>
+          </a:prstGeom>
+        </p:spPr>
+      </p:pic>
+      <p:sp>
+        <p:nvSpPr>
+          <p:cNvPr id="15" name="TextBox 14">
+            <a:extLst>
+              <a:ext uri="{FF2B5EF4-FFF2-40B4-BE49-F238E27FC236}">
+                <a16:creationId xmlns:a16="http://schemas.microsoft.com/office/drawing/2014/main" id="{8D96CD51-B8F5-2B4B-8A52-059502B79555}"/>
+              </a:ext>
+            </a:extLst>
+          </p:cNvPr>
+          <p:cNvSpPr txBox="1"/>
+          <p:nvPr/>
+        </p:nvSpPr>
+        <p:spPr>
+          <a:xfrm>
+            <a:off x="945423" y="528112"/>
+            <a:ext cx="2578270" cy="369332"/>
+          </a:xfrm>
+          <a:prstGeom prst="rect">
+            <a:avLst/>
+          </a:prstGeom>
+          <a:noFill/>
+        </p:spPr>
+        <p:txBody>
+          <a:bodyPr wrap="none" rtlCol="0">
+            <a:spAutoFit/>
+          </a:bodyPr>
+          <a:lstStyle/>
+          <a:p>
+            <a:r>
+              <a:rPr lang="en-US" dirty="0"/>
+              <a:t>Just 2% of measurements</a:t>
+            </a:r>
+          </a:p>
+        </p:txBody>
+      </p:sp>
+      <p:pic>
+        <p:nvPicPr>
+          <p:cNvPr id="17" name="Picture 16">
+            <a:extLst>
+              <a:ext uri="{FF2B5EF4-FFF2-40B4-BE49-F238E27FC236}">
+                <a16:creationId xmlns:a16="http://schemas.microsoft.com/office/drawing/2014/main" id="{E8604359-E03D-844C-8D8C-EE9CAB2CE2F6}"/>
+              </a:ext>
+            </a:extLst>
+          </p:cNvPr>
+          <p:cNvPicPr>
+            <a:picLocks noChangeAspect="1"/>
+          </p:cNvPicPr>
+          <p:nvPr/>
+        </p:nvPicPr>
+        <p:blipFill>
+          <a:blip r:embed="rId3"/>
+          <a:stretch>
+            <a:fillRect/>
+          </a:stretch>
+        </p:blipFill>
+        <p:spPr>
+          <a:xfrm>
+            <a:off x="4289763" y="1212343"/>
+            <a:ext cx="3771110" cy="2780490"/>
+          </a:xfrm>
+          <a:prstGeom prst="rect">
+            <a:avLst/>
+          </a:prstGeom>
+        </p:spPr>
+      </p:pic>
+      <p:pic>
+        <p:nvPicPr>
+          <p:cNvPr id="19" name="Picture 18">
+            <a:extLst>
+              <a:ext uri="{FF2B5EF4-FFF2-40B4-BE49-F238E27FC236}">
+                <a16:creationId xmlns:a16="http://schemas.microsoft.com/office/drawing/2014/main" id="{B0A53854-E8D3-5A41-B018-945D4DEEFE0E}"/>
+              </a:ext>
+            </a:extLst>
+          </p:cNvPr>
+          <p:cNvPicPr>
+            <a:picLocks noChangeAspect="1"/>
+          </p:cNvPicPr>
+          <p:nvPr/>
+        </p:nvPicPr>
+        <p:blipFill>
+          <a:blip r:embed="rId4"/>
+          <a:stretch>
+            <a:fillRect/>
+          </a:stretch>
+        </p:blipFill>
+        <p:spPr>
+          <a:xfrm>
+            <a:off x="8596732" y="1077102"/>
+            <a:ext cx="3065854" cy="3050971"/>
+          </a:xfrm>
+          <a:prstGeom prst="rect">
+            <a:avLst/>
+          </a:prstGeom>
+        </p:spPr>
+      </p:pic>
+      <p:pic>
+        <p:nvPicPr>
+          <p:cNvPr id="21" name="Picture 20">
+            <a:extLst>
+              <a:ext uri="{FF2B5EF4-FFF2-40B4-BE49-F238E27FC236}">
+                <a16:creationId xmlns:a16="http://schemas.microsoft.com/office/drawing/2014/main" id="{A7D47EF5-F662-074D-9F95-CE960D466848}"/>
+              </a:ext>
+            </a:extLst>
+          </p:cNvPr>
+          <p:cNvPicPr>
+            <a:picLocks noChangeAspect="1"/>
+          </p:cNvPicPr>
+          <p:nvPr/>
+        </p:nvPicPr>
+        <p:blipFill>
+          <a:blip r:embed="rId5"/>
+          <a:stretch>
+            <a:fillRect/>
+          </a:stretch>
+        </p:blipFill>
+        <p:spPr>
+          <a:xfrm>
+            <a:off x="4705040" y="4240179"/>
+            <a:ext cx="3119869" cy="2617821"/>
+          </a:xfrm>
+          <a:prstGeom prst="rect">
+            <a:avLst/>
+          </a:prstGeom>
+        </p:spPr>
+      </p:pic>
+    </p:spTree>
+    <p:extLst>
+      <p:ext uri="{BB962C8B-B14F-4D97-AF65-F5344CB8AC3E}">
+        <p14:creationId xmlns:p14="http://schemas.microsoft.com/office/powerpoint/2010/main" val="4168040403"/>
+      </p:ext>
+    </p:extLst>
+  </p:cSld>
+  <p:clrMapOvr>
+    <a:masterClrMapping/>
+  </p:clrMapOvr>
+</p:sld>
+</file>
+
+<file path=ppt/slides/slide6.xml><?xml version="1.0" encoding="utf-8"?>
+<p:sld xmlns:a="http://schemas.openxmlformats.org/drawingml/2006/main" xmlns:r="http://schemas.openxmlformats.org/officeDocument/2006/relationships" xmlns:p="http://schemas.openxmlformats.org/presentationml/2006/main">
+  <p:cSld>
+    <p:spTree>
+      <p:nvGrpSpPr>
+        <p:cNvPr id="1" name=""/>
+        <p:cNvGrpSpPr/>
+        <p:nvPr/>
+      </p:nvGrpSpPr>
+      <p:grpSpPr>
+        <a:xfrm>
+          <a:off x="0" y="0"/>
+          <a:ext cx="0" cy="0"/>
+          <a:chOff x="0" y="0"/>
+          <a:chExt cx="0" cy="0"/>
+        </a:xfrm>
+      </p:grpSpPr>
+      <p:pic>
+        <p:nvPicPr>
+          <p:cNvPr id="3" name="Picture 2">
+            <a:extLst>
+              <a:ext uri="{FF2B5EF4-FFF2-40B4-BE49-F238E27FC236}">
+                <a16:creationId xmlns:a16="http://schemas.microsoft.com/office/drawing/2014/main" id="{1AA6D635-8DE2-5F4C-8E79-00314D2F0B54}"/>
+              </a:ext>
+            </a:extLst>
+          </p:cNvPr>
+          <p:cNvPicPr>
+            <a:picLocks noChangeAspect="1"/>
+          </p:cNvPicPr>
+          <p:nvPr/>
+        </p:nvPicPr>
+        <p:blipFill>
+          <a:blip r:embed="rId2"/>
+          <a:stretch>
+            <a:fillRect/>
+          </a:stretch>
+        </p:blipFill>
+        <p:spPr>
+          <a:xfrm>
+            <a:off x="156589" y="1028565"/>
+            <a:ext cx="3746500" cy="3263900"/>
+          </a:xfrm>
+          <a:prstGeom prst="rect">
+            <a:avLst/>
+          </a:prstGeom>
+        </p:spPr>
+      </p:pic>
+      <p:pic>
+        <p:nvPicPr>
+          <p:cNvPr id="5" name="Picture 4">
+            <a:extLst>
+              <a:ext uri="{FF2B5EF4-FFF2-40B4-BE49-F238E27FC236}">
+                <a16:creationId xmlns:a16="http://schemas.microsoft.com/office/drawing/2014/main" id="{0D1A159D-40CC-A445-8542-55BA2049A431}"/>
+              </a:ext>
+            </a:extLst>
+          </p:cNvPr>
+          <p:cNvPicPr>
+            <a:picLocks noChangeAspect="1"/>
+          </p:cNvPicPr>
+          <p:nvPr/>
+        </p:nvPicPr>
+        <p:blipFill>
+          <a:blip r:embed="rId3"/>
+          <a:stretch>
+            <a:fillRect/>
+          </a:stretch>
+        </p:blipFill>
+        <p:spPr>
+          <a:xfrm>
+            <a:off x="3903089" y="1239078"/>
+            <a:ext cx="3746500" cy="2842873"/>
+          </a:xfrm>
+          <a:prstGeom prst="rect">
+            <a:avLst/>
+          </a:prstGeom>
+        </p:spPr>
+      </p:pic>
+      <p:pic>
+        <p:nvPicPr>
+          <p:cNvPr id="7" name="Picture 6">
+            <a:extLst>
+              <a:ext uri="{FF2B5EF4-FFF2-40B4-BE49-F238E27FC236}">
+                <a16:creationId xmlns:a16="http://schemas.microsoft.com/office/drawing/2014/main" id="{59D74B4D-43D6-5548-A28E-8B0293E2016B}"/>
+              </a:ext>
+            </a:extLst>
+          </p:cNvPr>
+          <p:cNvPicPr>
+            <a:picLocks noChangeAspect="1"/>
+          </p:cNvPicPr>
+          <p:nvPr/>
+        </p:nvPicPr>
+        <p:blipFill>
+          <a:blip r:embed="rId4"/>
+          <a:stretch>
+            <a:fillRect/>
+          </a:stretch>
+        </p:blipFill>
+        <p:spPr>
+          <a:xfrm>
+            <a:off x="7799557" y="914264"/>
+            <a:ext cx="3771900" cy="3492500"/>
+          </a:xfrm>
+          <a:prstGeom prst="rect">
+            <a:avLst/>
+          </a:prstGeom>
+        </p:spPr>
+      </p:pic>
+      <p:pic>
+        <p:nvPicPr>
+          <p:cNvPr id="11" name="Picture 10">
+            <a:extLst>
+              <a:ext uri="{FF2B5EF4-FFF2-40B4-BE49-F238E27FC236}">
+                <a16:creationId xmlns:a16="http://schemas.microsoft.com/office/drawing/2014/main" id="{E38B9648-7C2E-144B-92F6-432037F38BF9}"/>
+              </a:ext>
+            </a:extLst>
+          </p:cNvPr>
+          <p:cNvPicPr>
+            <a:picLocks noChangeAspect="1"/>
+          </p:cNvPicPr>
+          <p:nvPr/>
+        </p:nvPicPr>
+        <p:blipFill>
+          <a:blip r:embed="rId5"/>
+          <a:stretch>
+            <a:fillRect/>
+          </a:stretch>
+        </p:blipFill>
+        <p:spPr>
+          <a:xfrm>
+            <a:off x="4392444" y="4292464"/>
+            <a:ext cx="2976933" cy="2464289"/>
+          </a:xfrm>
+          <a:prstGeom prst="rect">
+            <a:avLst/>
+          </a:prstGeom>
+        </p:spPr>
+      </p:pic>
+    </p:spTree>
+    <p:extLst>
+      <p:ext uri="{BB962C8B-B14F-4D97-AF65-F5344CB8AC3E}">
+        <p14:creationId xmlns:p14="http://schemas.microsoft.com/office/powerpoint/2010/main" val="1923623714"/>
+      </p:ext>
+    </p:extLst>
+  </p:cSld>
+  <p:clrMapOvr>
+    <a:masterClrMapping/>
+  </p:clrMapOvr>
+</p:sld>
+</file>
+
 <file path=ppt/theme/theme1.xml><?xml version="1.0" encoding="utf-8"?>
 <a:theme xmlns:a="http://schemas.openxmlformats.org/drawingml/2006/main" name="Office Theme">
   <a:themeElements>

</xml_diff>

<commit_message>
updated ppt and tex
</commit_message>
<xml_diff>
--- a/preject.pptx
+++ b/preject.pptx
@@ -10,14 +10,16 @@
     <p:sldId id="263" r:id="rId4"/>
     <p:sldId id="265" r:id="rId5"/>
     <p:sldId id="266" r:id="rId6"/>
-    <p:sldId id="257" r:id="rId7"/>
-    <p:sldId id="267" r:id="rId8"/>
-    <p:sldId id="260" r:id="rId9"/>
-    <p:sldId id="270" r:id="rId10"/>
-    <p:sldId id="268" r:id="rId11"/>
-    <p:sldId id="259" r:id="rId12"/>
-    <p:sldId id="261" r:id="rId13"/>
-    <p:sldId id="269" r:id="rId14"/>
+    <p:sldId id="271" r:id="rId7"/>
+    <p:sldId id="257" r:id="rId8"/>
+    <p:sldId id="267" r:id="rId9"/>
+    <p:sldId id="272" r:id="rId10"/>
+    <p:sldId id="260" r:id="rId11"/>
+    <p:sldId id="268" r:id="rId12"/>
+    <p:sldId id="273" r:id="rId13"/>
+    <p:sldId id="259" r:id="rId14"/>
+    <p:sldId id="261" r:id="rId15"/>
+    <p:sldId id="269" r:id="rId16"/>
   </p:sldIdLst>
   <p:sldSz cx="12192000" cy="6858000"/>
   <p:notesSz cx="6858000" cy="9144000"/>
@@ -3420,106 +3422,12 @@
           <a:chExt cx="0" cy="0"/>
         </a:xfrm>
       </p:grpSpPr>
-      <p:sp>
-        <p:nvSpPr>
-          <p:cNvPr id="8" name="TextBox 7">
-            <a:extLst>
-              <a:ext uri="{FF2B5EF4-FFF2-40B4-BE49-F238E27FC236}">
-                <a16:creationId xmlns:a16="http://schemas.microsoft.com/office/drawing/2014/main" id="{C74BE216-385C-9146-B656-C67128BA1F10}"/>
-              </a:ext>
-            </a:extLst>
-          </p:cNvPr>
-          <p:cNvSpPr txBox="1"/>
-          <p:nvPr/>
-        </p:nvSpPr>
-        <p:spPr>
-          <a:xfrm>
-            <a:off x="21425" y="69378"/>
-            <a:ext cx="3565528" cy="400110"/>
-          </a:xfrm>
-          <a:prstGeom prst="rect">
-            <a:avLst/>
-          </a:prstGeom>
-          <a:noFill/>
-        </p:spPr>
-        <p:txBody>
-          <a:bodyPr wrap="none" rtlCol="0">
-            <a:spAutoFit/>
-          </a:bodyPr>
-          <a:lstStyle/>
-          <a:p>
-            <a:r>
-              <a:rPr lang="en-US" sz="2000" dirty="0"/>
-              <a:t>Toy problem 2: Data preparation</a:t>
-            </a:r>
-          </a:p>
-        </p:txBody>
-      </p:sp>
-      <p:sp>
-        <p:nvSpPr>
-          <p:cNvPr id="2" name="TextBox 1">
-            <a:extLst>
-              <a:ext uri="{FF2B5EF4-FFF2-40B4-BE49-F238E27FC236}">
-                <a16:creationId xmlns:a16="http://schemas.microsoft.com/office/drawing/2014/main" id="{4625E87B-44B7-AA4E-91AF-177B570A647A}"/>
-              </a:ext>
-            </a:extLst>
-          </p:cNvPr>
-          <p:cNvSpPr txBox="1"/>
-          <p:nvPr/>
-        </p:nvSpPr>
-        <p:spPr>
-          <a:xfrm>
-            <a:off x="446567" y="667582"/>
-            <a:ext cx="7309502" cy="923330"/>
-          </a:xfrm>
-          <a:prstGeom prst="rect">
-            <a:avLst/>
-          </a:prstGeom>
-          <a:noFill/>
-        </p:spPr>
-        <p:txBody>
-          <a:bodyPr wrap="none" rtlCol="0">
-            <a:spAutoFit/>
-          </a:bodyPr>
-          <a:lstStyle/>
-          <a:p>
-            <a:pPr marL="285750" indent="-285750">
-              <a:buFont typeface="Arial" panose="020B0604020202020204" pitchFamily="34" charset="0"/>
-              <a:buChar char="•"/>
-            </a:pPr>
-            <a:r>
-              <a:rPr lang="en-US" dirty="0"/>
-              <a:t>we record 300 snapshots from beginning to the steady state condition</a:t>
-            </a:r>
-          </a:p>
-          <a:p>
-            <a:pPr marL="285750" indent="-285750">
-              <a:buFont typeface="Arial" panose="020B0604020202020204" pitchFamily="34" charset="0"/>
-              <a:buChar char="•"/>
-            </a:pPr>
-            <a:r>
-              <a:rPr lang="en-US" dirty="0"/>
-              <a:t>250 random snapshots are used to construct the library</a:t>
-            </a:r>
-          </a:p>
-          <a:p>
-            <a:pPr marL="285750" indent="-285750">
-              <a:buFont typeface="Arial" panose="020B0604020202020204" pitchFamily="34" charset="0"/>
-              <a:buChar char="•"/>
-            </a:pPr>
-            <a:r>
-              <a:rPr lang="en-US" dirty="0"/>
-              <a:t>For reconstruction we select from those data not presented in the library</a:t>
-            </a:r>
-          </a:p>
-        </p:txBody>
-      </p:sp>
       <p:pic>
         <p:nvPicPr>
-          <p:cNvPr id="16" name="Picture 15">
-            <a:extLst>
-              <a:ext uri="{FF2B5EF4-FFF2-40B4-BE49-F238E27FC236}">
-                <a16:creationId xmlns:a16="http://schemas.microsoft.com/office/drawing/2014/main" id="{65409BF2-3A98-304C-B0C0-C2C07DB9111F}"/>
+          <p:cNvPr id="3" name="Picture 2">
+            <a:extLst>
+              <a:ext uri="{FF2B5EF4-FFF2-40B4-BE49-F238E27FC236}">
+                <a16:creationId xmlns:a16="http://schemas.microsoft.com/office/drawing/2014/main" id="{041C70E5-B258-C540-8E1C-1357F56956E4}"/>
               </a:ext>
             </a:extLst>
           </p:cNvPr>
@@ -3536,20 +3444,50 @@
         </p:blipFill>
         <p:spPr>
           <a:xfrm>
-            <a:off x="3933594" y="2663554"/>
-            <a:ext cx="3822306" cy="3822306"/>
+            <a:off x="3915947" y="2598255"/>
+            <a:ext cx="1869533" cy="1869533"/>
           </a:xfrm>
           <a:prstGeom prst="rect">
             <a:avLst/>
           </a:prstGeom>
         </p:spPr>
       </p:pic>
-      <p:sp>
-        <p:nvSpPr>
-          <p:cNvPr id="17" name="TextBox 16">
-            <a:extLst>
-              <a:ext uri="{FF2B5EF4-FFF2-40B4-BE49-F238E27FC236}">
-                <a16:creationId xmlns:a16="http://schemas.microsoft.com/office/drawing/2014/main" id="{E1110C96-CEE7-4F4C-BE0E-0A9226903BB0}"/>
+      <p:pic>
+        <p:nvPicPr>
+          <p:cNvPr id="11" name="Picture 10">
+            <a:extLst>
+              <a:ext uri="{FF2B5EF4-FFF2-40B4-BE49-F238E27FC236}">
+                <a16:creationId xmlns:a16="http://schemas.microsoft.com/office/drawing/2014/main" id="{C327F4C0-73E3-C14C-9B0D-EBB396FC02EE}"/>
+              </a:ext>
+            </a:extLst>
+          </p:cNvPr>
+          <p:cNvPicPr>
+            <a:picLocks noChangeAspect="1"/>
+          </p:cNvPicPr>
+          <p:nvPr/>
+        </p:nvPicPr>
+        <p:blipFill>
+          <a:blip r:embed="rId3"/>
+          <a:stretch>
+            <a:fillRect/>
+          </a:stretch>
+        </p:blipFill>
+        <p:spPr>
+          <a:xfrm>
+            <a:off x="3824175" y="4678325"/>
+            <a:ext cx="1869533" cy="1886005"/>
+          </a:xfrm>
+          <a:prstGeom prst="rect">
+            <a:avLst/>
+          </a:prstGeom>
+        </p:spPr>
+      </p:pic>
+      <p:sp>
+        <p:nvSpPr>
+          <p:cNvPr id="4" name="TextBox 3">
+            <a:extLst>
+              <a:ext uri="{FF2B5EF4-FFF2-40B4-BE49-F238E27FC236}">
+                <a16:creationId xmlns:a16="http://schemas.microsoft.com/office/drawing/2014/main" id="{62CC6AB0-6FC9-C742-BCEA-0FF8A995BAE9}"/>
               </a:ext>
             </a:extLst>
           </p:cNvPr>
@@ -3558,8 +3496,8 @@
         </p:nvSpPr>
         <p:spPr>
           <a:xfrm>
-            <a:off x="4700540" y="2294222"/>
-            <a:ext cx="2578270" cy="369332"/>
+            <a:off x="203504" y="5430819"/>
+            <a:ext cx="2756076" cy="369332"/>
           </a:xfrm>
           <a:prstGeom prst="rect">
             <a:avLst/>
@@ -3574,15 +3512,266 @@
           <a:p>
             <a:r>
               <a:rPr lang="en-US" dirty="0"/>
-              <a:t>Just 2% of measurements</a:t>
-            </a:r>
-          </a:p>
-        </p:txBody>
-      </p:sp>
+              <a:t>2- Down sampled and crop </a:t>
+            </a:r>
+          </a:p>
+        </p:txBody>
+      </p:sp>
+      <p:sp>
+        <p:nvSpPr>
+          <p:cNvPr id="8" name="TextBox 7">
+            <a:extLst>
+              <a:ext uri="{FF2B5EF4-FFF2-40B4-BE49-F238E27FC236}">
+                <a16:creationId xmlns:a16="http://schemas.microsoft.com/office/drawing/2014/main" id="{C74BE216-385C-9146-B656-C67128BA1F10}"/>
+              </a:ext>
+            </a:extLst>
+          </p:cNvPr>
+          <p:cNvSpPr txBox="1"/>
+          <p:nvPr/>
+        </p:nvSpPr>
+        <p:spPr>
+          <a:xfrm>
+            <a:off x="21425" y="69378"/>
+            <a:ext cx="3565528" cy="400110"/>
+          </a:xfrm>
+          <a:prstGeom prst="rect">
+            <a:avLst/>
+          </a:prstGeom>
+          <a:noFill/>
+        </p:spPr>
+        <p:txBody>
+          <a:bodyPr wrap="none" rtlCol="0">
+            <a:spAutoFit/>
+          </a:bodyPr>
+          <a:lstStyle/>
+          <a:p>
+            <a:r>
+              <a:rPr lang="en-US" sz="2000" dirty="0"/>
+              <a:t>Toy problem 2: Data preparation</a:t>
+            </a:r>
+          </a:p>
+        </p:txBody>
+      </p:sp>
+      <p:sp>
+        <p:nvSpPr>
+          <p:cNvPr id="5" name="TextBox 4">
+            <a:extLst>
+              <a:ext uri="{FF2B5EF4-FFF2-40B4-BE49-F238E27FC236}">
+                <a16:creationId xmlns:a16="http://schemas.microsoft.com/office/drawing/2014/main" id="{A8E2949C-DFFA-C640-AF27-AD36FD633E8E}"/>
+              </a:ext>
+            </a:extLst>
+          </p:cNvPr>
+          <p:cNvSpPr txBox="1"/>
+          <p:nvPr/>
+        </p:nvSpPr>
+        <p:spPr>
+          <a:xfrm>
+            <a:off x="157628" y="3163690"/>
+            <a:ext cx="2852832" cy="369332"/>
+          </a:xfrm>
+          <a:prstGeom prst="rect">
+            <a:avLst/>
+          </a:prstGeom>
+          <a:noFill/>
+        </p:spPr>
+        <p:txBody>
+          <a:bodyPr wrap="none" rtlCol="0">
+            <a:spAutoFit/>
+          </a:bodyPr>
+          <a:lstStyle/>
+          <a:p>
+            <a:r>
+              <a:rPr lang="en-US" dirty="0"/>
+              <a:t>1- we binarized the solution </a:t>
+            </a:r>
+          </a:p>
+        </p:txBody>
+      </p:sp>
+      <p:sp>
+        <p:nvSpPr>
+          <p:cNvPr id="10" name="TextBox 9">
+            <a:extLst>
+              <a:ext uri="{FF2B5EF4-FFF2-40B4-BE49-F238E27FC236}">
+                <a16:creationId xmlns:a16="http://schemas.microsoft.com/office/drawing/2014/main" id="{EDD8CB23-6CD0-A143-8279-4727EB4169ED}"/>
+              </a:ext>
+            </a:extLst>
+          </p:cNvPr>
+          <p:cNvSpPr txBox="1"/>
+          <p:nvPr/>
+        </p:nvSpPr>
+        <p:spPr>
+          <a:xfrm>
+            <a:off x="9130223" y="950127"/>
+            <a:ext cx="2381293" cy="584775"/>
+          </a:xfrm>
+          <a:prstGeom prst="rect">
+            <a:avLst/>
+          </a:prstGeom>
+          <a:noFill/>
+        </p:spPr>
+        <p:txBody>
+          <a:bodyPr wrap="square" rtlCol="0">
+            <a:spAutoFit/>
+          </a:bodyPr>
+          <a:lstStyle/>
+          <a:p>
+            <a:r>
+              <a:rPr lang="en-US" sz="1600" dirty="0"/>
+              <a:t>Computational domain has a graph structure</a:t>
+            </a:r>
+          </a:p>
+        </p:txBody>
+      </p:sp>
+      <p:sp>
+        <p:nvSpPr>
+          <p:cNvPr id="13" name="TextBox 12">
+            <a:extLst>
+              <a:ext uri="{FF2B5EF4-FFF2-40B4-BE49-F238E27FC236}">
+                <a16:creationId xmlns:a16="http://schemas.microsoft.com/office/drawing/2014/main" id="{5F33CCCB-7E90-164B-891C-1D41168D9A13}"/>
+              </a:ext>
+            </a:extLst>
+          </p:cNvPr>
+          <p:cNvSpPr txBox="1"/>
+          <p:nvPr/>
+        </p:nvSpPr>
+        <p:spPr>
+          <a:xfrm>
+            <a:off x="203504" y="1057849"/>
+            <a:ext cx="2570575" cy="369332"/>
+          </a:xfrm>
+          <a:prstGeom prst="rect">
+            <a:avLst/>
+          </a:prstGeom>
+          <a:noFill/>
+        </p:spPr>
+        <p:txBody>
+          <a:bodyPr wrap="none" rtlCol="0">
+            <a:spAutoFit/>
+          </a:bodyPr>
+          <a:lstStyle/>
+          <a:p>
+            <a:r>
+              <a:rPr lang="en-US" dirty="0"/>
+              <a:t>0-field solution from FEM</a:t>
+            </a:r>
+          </a:p>
+        </p:txBody>
+      </p:sp>
+      <p:pic>
+        <p:nvPicPr>
+          <p:cNvPr id="14" name="Picture 13">
+            <a:extLst>
+              <a:ext uri="{FF2B5EF4-FFF2-40B4-BE49-F238E27FC236}">
+                <a16:creationId xmlns:a16="http://schemas.microsoft.com/office/drawing/2014/main" id="{936D074F-FCBD-F146-B045-C7D78E96CB97}"/>
+              </a:ext>
+            </a:extLst>
+          </p:cNvPr>
+          <p:cNvPicPr>
+            <a:picLocks noChangeAspect="1"/>
+          </p:cNvPicPr>
+          <p:nvPr/>
+        </p:nvPicPr>
+        <p:blipFill>
+          <a:blip r:embed="rId4"/>
+          <a:stretch>
+            <a:fillRect/>
+          </a:stretch>
+        </p:blipFill>
+        <p:spPr>
+          <a:xfrm>
+            <a:off x="4054548" y="591442"/>
+            <a:ext cx="1477147" cy="1460642"/>
+          </a:xfrm>
+          <a:prstGeom prst="rect">
+            <a:avLst/>
+          </a:prstGeom>
+        </p:spPr>
+      </p:pic>
+      <p:sp>
+        <p:nvSpPr>
+          <p:cNvPr id="15" name="TextBox 14">
+            <a:extLst>
+              <a:ext uri="{FF2B5EF4-FFF2-40B4-BE49-F238E27FC236}">
+                <a16:creationId xmlns:a16="http://schemas.microsoft.com/office/drawing/2014/main" id="{F1C1B91F-C21C-4E41-832D-23EC7E2A8450}"/>
+              </a:ext>
+            </a:extLst>
+          </p:cNvPr>
+          <p:cNvSpPr txBox="1"/>
+          <p:nvPr/>
+        </p:nvSpPr>
+        <p:spPr>
+          <a:xfrm>
+            <a:off x="8150055" y="4078160"/>
+            <a:ext cx="3618614" cy="1200329"/>
+          </a:xfrm>
+          <a:prstGeom prst="rect">
+            <a:avLst/>
+          </a:prstGeom>
+          <a:noFill/>
+        </p:spPr>
+        <p:txBody>
+          <a:bodyPr wrap="square" rtlCol="0">
+            <a:spAutoFit/>
+          </a:bodyPr>
+          <a:lstStyle/>
+          <a:p>
+            <a:pPr algn="ctr"/>
+            <a:r>
+              <a:rPr lang="en-US" sz="2400" dirty="0">
+                <a:solidFill>
+                  <a:srgbClr val="00B0F0"/>
+                </a:solidFill>
+              </a:rPr>
+              <a:t>To be as close as possible to experimental </a:t>
+            </a:r>
+          </a:p>
+          <a:p>
+            <a:pPr algn="ctr"/>
+            <a:r>
+              <a:rPr lang="en-US" sz="2400" dirty="0">
+                <a:solidFill>
+                  <a:srgbClr val="00B0F0"/>
+                </a:solidFill>
+              </a:rPr>
+              <a:t>conditions!</a:t>
+            </a:r>
+          </a:p>
+        </p:txBody>
+      </p:sp>
+      <p:pic>
+        <p:nvPicPr>
+          <p:cNvPr id="17" name="Picture 16">
+            <a:extLst>
+              <a:ext uri="{FF2B5EF4-FFF2-40B4-BE49-F238E27FC236}">
+                <a16:creationId xmlns:a16="http://schemas.microsoft.com/office/drawing/2014/main" id="{3F05394D-B945-8C41-90CC-268D696D2433}"/>
+              </a:ext>
+            </a:extLst>
+          </p:cNvPr>
+          <p:cNvPicPr>
+            <a:picLocks noChangeAspect="1"/>
+          </p:cNvPicPr>
+          <p:nvPr/>
+        </p:nvPicPr>
+        <p:blipFill>
+          <a:blip r:embed="rId5"/>
+          <a:stretch>
+            <a:fillRect/>
+          </a:stretch>
+        </p:blipFill>
+        <p:spPr>
+          <a:xfrm>
+            <a:off x="6438405" y="373191"/>
+            <a:ext cx="2691818" cy="1859647"/>
+          </a:xfrm>
+          <a:prstGeom prst="rect">
+            <a:avLst/>
+          </a:prstGeom>
+        </p:spPr>
+      </p:pic>
     </p:spTree>
     <p:extLst>
       <p:ext uri="{BB962C8B-B14F-4D97-AF65-F5344CB8AC3E}">
-        <p14:creationId xmlns:p14="http://schemas.microsoft.com/office/powerpoint/2010/main" val="3599638248"/>
+        <p14:creationId xmlns:p14="http://schemas.microsoft.com/office/powerpoint/2010/main" val="968249077"/>
       </p:ext>
     </p:extLst>
   </p:cSld>
@@ -3609,12 +3798,106 @@
           <a:chExt cx="0" cy="0"/>
         </a:xfrm>
       </p:grpSpPr>
+      <p:sp>
+        <p:nvSpPr>
+          <p:cNvPr id="8" name="TextBox 7">
+            <a:extLst>
+              <a:ext uri="{FF2B5EF4-FFF2-40B4-BE49-F238E27FC236}">
+                <a16:creationId xmlns:a16="http://schemas.microsoft.com/office/drawing/2014/main" id="{C74BE216-385C-9146-B656-C67128BA1F10}"/>
+              </a:ext>
+            </a:extLst>
+          </p:cNvPr>
+          <p:cNvSpPr txBox="1"/>
+          <p:nvPr/>
+        </p:nvSpPr>
+        <p:spPr>
+          <a:xfrm>
+            <a:off x="21425" y="69378"/>
+            <a:ext cx="3565528" cy="400110"/>
+          </a:xfrm>
+          <a:prstGeom prst="rect">
+            <a:avLst/>
+          </a:prstGeom>
+          <a:noFill/>
+        </p:spPr>
+        <p:txBody>
+          <a:bodyPr wrap="none" rtlCol="0">
+            <a:spAutoFit/>
+          </a:bodyPr>
+          <a:lstStyle/>
+          <a:p>
+            <a:r>
+              <a:rPr lang="en-US" sz="2000" dirty="0"/>
+              <a:t>Toy problem 2: Data preparation</a:t>
+            </a:r>
+          </a:p>
+        </p:txBody>
+      </p:sp>
+      <p:sp>
+        <p:nvSpPr>
+          <p:cNvPr id="2" name="TextBox 1">
+            <a:extLst>
+              <a:ext uri="{FF2B5EF4-FFF2-40B4-BE49-F238E27FC236}">
+                <a16:creationId xmlns:a16="http://schemas.microsoft.com/office/drawing/2014/main" id="{4625E87B-44B7-AA4E-91AF-177B570A647A}"/>
+              </a:ext>
+            </a:extLst>
+          </p:cNvPr>
+          <p:cNvSpPr txBox="1"/>
+          <p:nvPr/>
+        </p:nvSpPr>
+        <p:spPr>
+          <a:xfrm>
+            <a:off x="446567" y="667582"/>
+            <a:ext cx="7309502" cy="923330"/>
+          </a:xfrm>
+          <a:prstGeom prst="rect">
+            <a:avLst/>
+          </a:prstGeom>
+          <a:noFill/>
+        </p:spPr>
+        <p:txBody>
+          <a:bodyPr wrap="none" rtlCol="0">
+            <a:spAutoFit/>
+          </a:bodyPr>
+          <a:lstStyle/>
+          <a:p>
+            <a:pPr marL="285750" indent="-285750">
+              <a:buFont typeface="Arial" panose="020B0604020202020204" pitchFamily="34" charset="0"/>
+              <a:buChar char="•"/>
+            </a:pPr>
+            <a:r>
+              <a:rPr lang="en-US" dirty="0"/>
+              <a:t>we record 300 snapshots from beginning to the steady state condition</a:t>
+            </a:r>
+          </a:p>
+          <a:p>
+            <a:pPr marL="285750" indent="-285750">
+              <a:buFont typeface="Arial" panose="020B0604020202020204" pitchFamily="34" charset="0"/>
+              <a:buChar char="•"/>
+            </a:pPr>
+            <a:r>
+              <a:rPr lang="en-US" dirty="0"/>
+              <a:t>250 random snapshots are used to construct the library</a:t>
+            </a:r>
+          </a:p>
+          <a:p>
+            <a:pPr marL="285750" indent="-285750">
+              <a:buFont typeface="Arial" panose="020B0604020202020204" pitchFamily="34" charset="0"/>
+              <a:buChar char="•"/>
+            </a:pPr>
+            <a:r>
+              <a:rPr lang="en-US" dirty="0"/>
+              <a:t>For reconstruction we select from those data not presented in the library</a:t>
+            </a:r>
+          </a:p>
+        </p:txBody>
+      </p:sp>
       <p:pic>
         <p:nvPicPr>
-          <p:cNvPr id="17" name="Picture 16">
-            <a:extLst>
-              <a:ext uri="{FF2B5EF4-FFF2-40B4-BE49-F238E27FC236}">
-                <a16:creationId xmlns:a16="http://schemas.microsoft.com/office/drawing/2014/main" id="{E8604359-E03D-844C-8D8C-EE9CAB2CE2F6}"/>
+          <p:cNvPr id="16" name="Picture 15">
+            <a:extLst>
+              <a:ext uri="{FF2B5EF4-FFF2-40B4-BE49-F238E27FC236}">
+                <a16:creationId xmlns:a16="http://schemas.microsoft.com/office/drawing/2014/main" id="{65409BF2-3A98-304C-B0C0-C2C07DB9111F}"/>
               </a:ext>
             </a:extLst>
           </p:cNvPr>
@@ -3631,80 +3914,20 @@
         </p:blipFill>
         <p:spPr>
           <a:xfrm>
-            <a:off x="472471" y="4299685"/>
-            <a:ext cx="3161860" cy="2331282"/>
+            <a:off x="3933594" y="2663554"/>
+            <a:ext cx="3822306" cy="3822306"/>
           </a:xfrm>
           <a:prstGeom prst="rect">
             <a:avLst/>
           </a:prstGeom>
         </p:spPr>
       </p:pic>
-      <p:pic>
-        <p:nvPicPr>
-          <p:cNvPr id="19" name="Picture 18">
-            <a:extLst>
-              <a:ext uri="{FF2B5EF4-FFF2-40B4-BE49-F238E27FC236}">
-                <a16:creationId xmlns:a16="http://schemas.microsoft.com/office/drawing/2014/main" id="{B0A53854-E8D3-5A41-B018-945D4DEEFE0E}"/>
-              </a:ext>
-            </a:extLst>
-          </p:cNvPr>
-          <p:cNvPicPr>
-            <a:picLocks noChangeAspect="1"/>
-          </p:cNvPicPr>
-          <p:nvPr/>
-        </p:nvPicPr>
-        <p:blipFill>
-          <a:blip r:embed="rId3"/>
-          <a:stretch>
-            <a:fillRect/>
-          </a:stretch>
-        </p:blipFill>
-        <p:spPr>
-          <a:xfrm>
-            <a:off x="5018960" y="4061637"/>
-            <a:ext cx="2647114" cy="2634264"/>
-          </a:xfrm>
-          <a:prstGeom prst="rect">
-            <a:avLst/>
-          </a:prstGeom>
-        </p:spPr>
-      </p:pic>
-      <p:pic>
-        <p:nvPicPr>
-          <p:cNvPr id="21" name="Picture 20">
-            <a:extLst>
-              <a:ext uri="{FF2B5EF4-FFF2-40B4-BE49-F238E27FC236}">
-                <a16:creationId xmlns:a16="http://schemas.microsoft.com/office/drawing/2014/main" id="{A7D47EF5-F662-074D-9F95-CE960D466848}"/>
-              </a:ext>
-            </a:extLst>
-          </p:cNvPr>
-          <p:cNvPicPr>
-            <a:picLocks noChangeAspect="1"/>
-          </p:cNvPicPr>
-          <p:nvPr/>
-        </p:nvPicPr>
-        <p:blipFill>
-          <a:blip r:embed="rId4"/>
-          <a:stretch>
-            <a:fillRect/>
-          </a:stretch>
-        </p:blipFill>
-        <p:spPr>
-          <a:xfrm>
-            <a:off x="8701661" y="4061636"/>
-            <a:ext cx="3139465" cy="2634264"/>
-          </a:xfrm>
-          <a:prstGeom prst="rect">
-            <a:avLst/>
-          </a:prstGeom>
-        </p:spPr>
-      </p:pic>
-      <p:sp>
-        <p:nvSpPr>
-          <p:cNvPr id="7" name="TextBox 6">
-            <a:extLst>
-              <a:ext uri="{FF2B5EF4-FFF2-40B4-BE49-F238E27FC236}">
-                <a16:creationId xmlns:a16="http://schemas.microsoft.com/office/drawing/2014/main" id="{5DF48528-55E9-EB49-A7D2-C6452EDF4ACB}"/>
+      <p:sp>
+        <p:nvSpPr>
+          <p:cNvPr id="17" name="TextBox 16">
+            <a:extLst>
+              <a:ext uri="{FF2B5EF4-FFF2-40B4-BE49-F238E27FC236}">
+                <a16:creationId xmlns:a16="http://schemas.microsoft.com/office/drawing/2014/main" id="{E1110C96-CEE7-4F4C-BE0E-0A9226903BB0}"/>
               </a:ext>
             </a:extLst>
           </p:cNvPr>
@@ -3713,8 +3936,8 @@
         </p:nvSpPr>
         <p:spPr>
           <a:xfrm>
-            <a:off x="0" y="60279"/>
-            <a:ext cx="5527732" cy="400110"/>
+            <a:off x="4700540" y="2294222"/>
+            <a:ext cx="2578270" cy="369332"/>
           </a:xfrm>
           <a:prstGeom prst="rect">
             <a:avLst/>
@@ -3728,178 +3951,8 @@
           <a:lstStyle/>
           <a:p>
             <a:r>
-              <a:rPr lang="en-US" sz="2000" dirty="0"/>
-              <a:t>Toy problem 2: LASSO reconstruction without noise</a:t>
-            </a:r>
-          </a:p>
-        </p:txBody>
-      </p:sp>
-      <p:pic>
-        <p:nvPicPr>
-          <p:cNvPr id="8" name="Picture 7">
-            <a:extLst>
-              <a:ext uri="{FF2B5EF4-FFF2-40B4-BE49-F238E27FC236}">
-                <a16:creationId xmlns:a16="http://schemas.microsoft.com/office/drawing/2014/main" id="{954484BE-D60E-C24F-ADB0-36204C44E1D9}"/>
-              </a:ext>
-            </a:extLst>
-          </p:cNvPr>
-          <p:cNvPicPr>
-            <a:picLocks noChangeAspect="1"/>
-          </p:cNvPicPr>
-          <p:nvPr/>
-        </p:nvPicPr>
-        <p:blipFill>
-          <a:blip r:embed="rId5"/>
-          <a:stretch>
-            <a:fillRect/>
-          </a:stretch>
-        </p:blipFill>
-        <p:spPr>
-          <a:xfrm>
-            <a:off x="2281527" y="433504"/>
-            <a:ext cx="2462659" cy="2462659"/>
-          </a:xfrm>
-          <a:prstGeom prst="rect">
-            <a:avLst/>
-          </a:prstGeom>
-        </p:spPr>
-      </p:pic>
-      <p:sp>
-        <p:nvSpPr>
-          <p:cNvPr id="2" name="TextBox 1">
-            <a:extLst>
-              <a:ext uri="{FF2B5EF4-FFF2-40B4-BE49-F238E27FC236}">
-                <a16:creationId xmlns:a16="http://schemas.microsoft.com/office/drawing/2014/main" id="{7D17BEAF-0739-934C-8337-2DAFA102468A}"/>
-              </a:ext>
-            </a:extLst>
-          </p:cNvPr>
-          <p:cNvSpPr txBox="1"/>
-          <p:nvPr/>
-        </p:nvSpPr>
-        <p:spPr>
-          <a:xfrm>
-            <a:off x="472471" y="1639432"/>
-            <a:ext cx="1477777" cy="369332"/>
-          </a:xfrm>
-          <a:prstGeom prst="rect">
-            <a:avLst/>
-          </a:prstGeom>
-          <a:noFill/>
-        </p:spPr>
-        <p:txBody>
-          <a:bodyPr wrap="none" rtlCol="0">
-            <a:spAutoFit/>
-          </a:bodyPr>
-          <a:lstStyle/>
-          <a:p>
-            <a:r>
               <a:rPr lang="en-US" dirty="0"/>
-              <a:t>Ground truth</a:t>
-            </a:r>
-          </a:p>
-        </p:txBody>
-      </p:sp>
-      <p:sp>
-        <p:nvSpPr>
-          <p:cNvPr id="3" name="TextBox 2">
-            <a:extLst>
-              <a:ext uri="{FF2B5EF4-FFF2-40B4-BE49-F238E27FC236}">
-                <a16:creationId xmlns:a16="http://schemas.microsoft.com/office/drawing/2014/main" id="{9F55C512-125E-5149-9898-D621B6BC6D09}"/>
-              </a:ext>
-            </a:extLst>
-          </p:cNvPr>
-          <p:cNvSpPr txBox="1"/>
-          <p:nvPr/>
-        </p:nvSpPr>
-        <p:spPr>
-          <a:xfrm>
-            <a:off x="1353343" y="3961837"/>
-            <a:ext cx="1801519" cy="369332"/>
-          </a:xfrm>
-          <a:prstGeom prst="rect">
-            <a:avLst/>
-          </a:prstGeom>
-          <a:noFill/>
-        </p:spPr>
-        <p:txBody>
-          <a:bodyPr wrap="none" rtlCol="0">
-            <a:spAutoFit/>
-          </a:bodyPr>
-          <a:lstStyle/>
-          <a:p>
-            <a:r>
-              <a:rPr lang="en-US" dirty="0"/>
-              <a:t>Recovered atoms</a:t>
-            </a:r>
-          </a:p>
-        </p:txBody>
-      </p:sp>
-      <p:sp>
-        <p:nvSpPr>
-          <p:cNvPr id="4" name="TextBox 3">
-            <a:extLst>
-              <a:ext uri="{FF2B5EF4-FFF2-40B4-BE49-F238E27FC236}">
-                <a16:creationId xmlns:a16="http://schemas.microsoft.com/office/drawing/2014/main" id="{55FBC8FF-4C3F-D942-A167-F1727C88432B}"/>
-              </a:ext>
-            </a:extLst>
-          </p:cNvPr>
-          <p:cNvSpPr txBox="1"/>
-          <p:nvPr/>
-        </p:nvSpPr>
-        <p:spPr>
-          <a:xfrm>
-            <a:off x="5547972" y="3745467"/>
-            <a:ext cx="1589089" cy="369332"/>
-          </a:xfrm>
-          <a:prstGeom prst="rect">
-            <a:avLst/>
-          </a:prstGeom>
-          <a:noFill/>
-        </p:spPr>
-        <p:txBody>
-          <a:bodyPr wrap="none" rtlCol="0">
-            <a:spAutoFit/>
-          </a:bodyPr>
-          <a:lstStyle/>
-          <a:p>
-            <a:r>
-              <a:rPr lang="en-US" dirty="0"/>
-              <a:t>Reconstructed</a:t>
-            </a:r>
-          </a:p>
-        </p:txBody>
-      </p:sp>
-      <p:sp>
-        <p:nvSpPr>
-          <p:cNvPr id="12" name="TextBox 11">
-            <a:extLst>
-              <a:ext uri="{FF2B5EF4-FFF2-40B4-BE49-F238E27FC236}">
-                <a16:creationId xmlns:a16="http://schemas.microsoft.com/office/drawing/2014/main" id="{2540C02B-BA79-FC4E-9328-BAC05A7F3CD1}"/>
-              </a:ext>
-            </a:extLst>
-          </p:cNvPr>
-          <p:cNvSpPr txBox="1"/>
-          <p:nvPr/>
-        </p:nvSpPr>
-        <p:spPr>
-          <a:xfrm>
-            <a:off x="9848988" y="3745467"/>
-            <a:ext cx="655436" cy="369332"/>
-          </a:xfrm>
-          <a:prstGeom prst="rect">
-            <a:avLst/>
-          </a:prstGeom>
-          <a:noFill/>
-        </p:spPr>
-        <p:txBody>
-          <a:bodyPr wrap="none" rtlCol="0">
-            <a:spAutoFit/>
-          </a:bodyPr>
-          <a:lstStyle/>
-          <a:p>
-            <a:r>
-              <a:rPr lang="en-US" dirty="0"/>
-              <a:t>Error</a:t>
+              <a:t>Just 2% of measurements</a:t>
             </a:r>
           </a:p>
         </p:txBody>
@@ -3907,7 +3960,7 @@
     </p:spTree>
     <p:extLst>
       <p:ext uri="{BB962C8B-B14F-4D97-AF65-F5344CB8AC3E}">
-        <p14:creationId xmlns:p14="http://schemas.microsoft.com/office/powerpoint/2010/main" val="4168040403"/>
+        <p14:creationId xmlns:p14="http://schemas.microsoft.com/office/powerpoint/2010/main" val="3599638248"/>
       </p:ext>
     </p:extLst>
   </p:cSld>
@@ -3936,6 +3989,391 @@
       </p:grpSpPr>
       <p:pic>
         <p:nvPicPr>
+          <p:cNvPr id="4" name="Picture 3">
+            <a:extLst>
+              <a:ext uri="{FF2B5EF4-FFF2-40B4-BE49-F238E27FC236}">
+                <a16:creationId xmlns:a16="http://schemas.microsoft.com/office/drawing/2014/main" id="{92D942E8-216A-EA4E-86AD-2D2F6029A41A}"/>
+              </a:ext>
+            </a:extLst>
+          </p:cNvPr>
+          <p:cNvPicPr>
+            <a:picLocks noChangeAspect="1"/>
+          </p:cNvPicPr>
+          <p:nvPr/>
+        </p:nvPicPr>
+        <p:blipFill>
+          <a:blip r:embed="rId2"/>
+          <a:stretch>
+            <a:fillRect/>
+          </a:stretch>
+        </p:blipFill>
+        <p:spPr>
+          <a:xfrm>
+            <a:off x="3546317" y="1168240"/>
+            <a:ext cx="4274491" cy="4274491"/>
+          </a:xfrm>
+          <a:prstGeom prst="rect">
+            <a:avLst/>
+          </a:prstGeom>
+        </p:spPr>
+      </p:pic>
+    </p:spTree>
+    <p:extLst>
+      <p:ext uri="{BB962C8B-B14F-4D97-AF65-F5344CB8AC3E}">
+        <p14:creationId xmlns:p14="http://schemas.microsoft.com/office/powerpoint/2010/main" val="2078637325"/>
+      </p:ext>
+    </p:extLst>
+  </p:cSld>
+  <p:clrMapOvr>
+    <a:masterClrMapping/>
+  </p:clrMapOvr>
+</p:sld>
+</file>
+
+<file path=ppt/slides/slide13.xml><?xml version="1.0" encoding="utf-8"?>
+<p:sld xmlns:a="http://schemas.openxmlformats.org/drawingml/2006/main" xmlns:r="http://schemas.openxmlformats.org/officeDocument/2006/relationships" xmlns:p="http://schemas.openxmlformats.org/presentationml/2006/main">
+  <p:cSld>
+    <p:spTree>
+      <p:nvGrpSpPr>
+        <p:cNvPr id="1" name=""/>
+        <p:cNvGrpSpPr/>
+        <p:nvPr/>
+      </p:nvGrpSpPr>
+      <p:grpSpPr>
+        <a:xfrm>
+          <a:off x="0" y="0"/>
+          <a:ext cx="0" cy="0"/>
+          <a:chOff x="0" y="0"/>
+          <a:chExt cx="0" cy="0"/>
+        </a:xfrm>
+      </p:grpSpPr>
+      <p:pic>
+        <p:nvPicPr>
+          <p:cNvPr id="17" name="Picture 16">
+            <a:extLst>
+              <a:ext uri="{FF2B5EF4-FFF2-40B4-BE49-F238E27FC236}">
+                <a16:creationId xmlns:a16="http://schemas.microsoft.com/office/drawing/2014/main" id="{E8604359-E03D-844C-8D8C-EE9CAB2CE2F6}"/>
+              </a:ext>
+            </a:extLst>
+          </p:cNvPr>
+          <p:cNvPicPr>
+            <a:picLocks noChangeAspect="1"/>
+          </p:cNvPicPr>
+          <p:nvPr/>
+        </p:nvPicPr>
+        <p:blipFill>
+          <a:blip r:embed="rId2"/>
+          <a:stretch>
+            <a:fillRect/>
+          </a:stretch>
+        </p:blipFill>
+        <p:spPr>
+          <a:xfrm>
+            <a:off x="472471" y="4299685"/>
+            <a:ext cx="3161860" cy="2331282"/>
+          </a:xfrm>
+          <a:prstGeom prst="rect">
+            <a:avLst/>
+          </a:prstGeom>
+        </p:spPr>
+      </p:pic>
+      <p:pic>
+        <p:nvPicPr>
+          <p:cNvPr id="19" name="Picture 18">
+            <a:extLst>
+              <a:ext uri="{FF2B5EF4-FFF2-40B4-BE49-F238E27FC236}">
+                <a16:creationId xmlns:a16="http://schemas.microsoft.com/office/drawing/2014/main" id="{B0A53854-E8D3-5A41-B018-945D4DEEFE0E}"/>
+              </a:ext>
+            </a:extLst>
+          </p:cNvPr>
+          <p:cNvPicPr>
+            <a:picLocks noChangeAspect="1"/>
+          </p:cNvPicPr>
+          <p:nvPr/>
+        </p:nvPicPr>
+        <p:blipFill>
+          <a:blip r:embed="rId3"/>
+          <a:stretch>
+            <a:fillRect/>
+          </a:stretch>
+        </p:blipFill>
+        <p:spPr>
+          <a:xfrm>
+            <a:off x="5018960" y="4061637"/>
+            <a:ext cx="2647114" cy="2634264"/>
+          </a:xfrm>
+          <a:prstGeom prst="rect">
+            <a:avLst/>
+          </a:prstGeom>
+        </p:spPr>
+      </p:pic>
+      <p:pic>
+        <p:nvPicPr>
+          <p:cNvPr id="21" name="Picture 20">
+            <a:extLst>
+              <a:ext uri="{FF2B5EF4-FFF2-40B4-BE49-F238E27FC236}">
+                <a16:creationId xmlns:a16="http://schemas.microsoft.com/office/drawing/2014/main" id="{A7D47EF5-F662-074D-9F95-CE960D466848}"/>
+              </a:ext>
+            </a:extLst>
+          </p:cNvPr>
+          <p:cNvPicPr>
+            <a:picLocks noChangeAspect="1"/>
+          </p:cNvPicPr>
+          <p:nvPr/>
+        </p:nvPicPr>
+        <p:blipFill>
+          <a:blip r:embed="rId4"/>
+          <a:stretch>
+            <a:fillRect/>
+          </a:stretch>
+        </p:blipFill>
+        <p:spPr>
+          <a:xfrm>
+            <a:off x="8701661" y="4061636"/>
+            <a:ext cx="3139465" cy="2634264"/>
+          </a:xfrm>
+          <a:prstGeom prst="rect">
+            <a:avLst/>
+          </a:prstGeom>
+        </p:spPr>
+      </p:pic>
+      <p:sp>
+        <p:nvSpPr>
+          <p:cNvPr id="7" name="TextBox 6">
+            <a:extLst>
+              <a:ext uri="{FF2B5EF4-FFF2-40B4-BE49-F238E27FC236}">
+                <a16:creationId xmlns:a16="http://schemas.microsoft.com/office/drawing/2014/main" id="{5DF48528-55E9-EB49-A7D2-C6452EDF4ACB}"/>
+              </a:ext>
+            </a:extLst>
+          </p:cNvPr>
+          <p:cNvSpPr txBox="1"/>
+          <p:nvPr/>
+        </p:nvSpPr>
+        <p:spPr>
+          <a:xfrm>
+            <a:off x="0" y="60279"/>
+            <a:ext cx="5527732" cy="400110"/>
+          </a:xfrm>
+          <a:prstGeom prst="rect">
+            <a:avLst/>
+          </a:prstGeom>
+          <a:noFill/>
+        </p:spPr>
+        <p:txBody>
+          <a:bodyPr wrap="none" rtlCol="0">
+            <a:spAutoFit/>
+          </a:bodyPr>
+          <a:lstStyle/>
+          <a:p>
+            <a:r>
+              <a:rPr lang="en-US" sz="2000" dirty="0"/>
+              <a:t>Toy problem 2: LASSO reconstruction without noise</a:t>
+            </a:r>
+          </a:p>
+        </p:txBody>
+      </p:sp>
+      <p:pic>
+        <p:nvPicPr>
+          <p:cNvPr id="8" name="Picture 7">
+            <a:extLst>
+              <a:ext uri="{FF2B5EF4-FFF2-40B4-BE49-F238E27FC236}">
+                <a16:creationId xmlns:a16="http://schemas.microsoft.com/office/drawing/2014/main" id="{954484BE-D60E-C24F-ADB0-36204C44E1D9}"/>
+              </a:ext>
+            </a:extLst>
+          </p:cNvPr>
+          <p:cNvPicPr>
+            <a:picLocks noChangeAspect="1"/>
+          </p:cNvPicPr>
+          <p:nvPr/>
+        </p:nvPicPr>
+        <p:blipFill>
+          <a:blip r:embed="rId5"/>
+          <a:stretch>
+            <a:fillRect/>
+          </a:stretch>
+        </p:blipFill>
+        <p:spPr>
+          <a:xfrm>
+            <a:off x="2281527" y="433504"/>
+            <a:ext cx="2462659" cy="2462659"/>
+          </a:xfrm>
+          <a:prstGeom prst="rect">
+            <a:avLst/>
+          </a:prstGeom>
+        </p:spPr>
+      </p:pic>
+      <p:sp>
+        <p:nvSpPr>
+          <p:cNvPr id="2" name="TextBox 1">
+            <a:extLst>
+              <a:ext uri="{FF2B5EF4-FFF2-40B4-BE49-F238E27FC236}">
+                <a16:creationId xmlns:a16="http://schemas.microsoft.com/office/drawing/2014/main" id="{7D17BEAF-0739-934C-8337-2DAFA102468A}"/>
+              </a:ext>
+            </a:extLst>
+          </p:cNvPr>
+          <p:cNvSpPr txBox="1"/>
+          <p:nvPr/>
+        </p:nvSpPr>
+        <p:spPr>
+          <a:xfrm>
+            <a:off x="472471" y="1639432"/>
+            <a:ext cx="1477777" cy="369332"/>
+          </a:xfrm>
+          <a:prstGeom prst="rect">
+            <a:avLst/>
+          </a:prstGeom>
+          <a:noFill/>
+        </p:spPr>
+        <p:txBody>
+          <a:bodyPr wrap="none" rtlCol="0">
+            <a:spAutoFit/>
+          </a:bodyPr>
+          <a:lstStyle/>
+          <a:p>
+            <a:r>
+              <a:rPr lang="en-US" dirty="0"/>
+              <a:t>Ground truth</a:t>
+            </a:r>
+          </a:p>
+        </p:txBody>
+      </p:sp>
+      <p:sp>
+        <p:nvSpPr>
+          <p:cNvPr id="3" name="TextBox 2">
+            <a:extLst>
+              <a:ext uri="{FF2B5EF4-FFF2-40B4-BE49-F238E27FC236}">
+                <a16:creationId xmlns:a16="http://schemas.microsoft.com/office/drawing/2014/main" id="{9F55C512-125E-5149-9898-D621B6BC6D09}"/>
+              </a:ext>
+            </a:extLst>
+          </p:cNvPr>
+          <p:cNvSpPr txBox="1"/>
+          <p:nvPr/>
+        </p:nvSpPr>
+        <p:spPr>
+          <a:xfrm>
+            <a:off x="1353343" y="3961837"/>
+            <a:ext cx="1801519" cy="369332"/>
+          </a:xfrm>
+          <a:prstGeom prst="rect">
+            <a:avLst/>
+          </a:prstGeom>
+          <a:noFill/>
+        </p:spPr>
+        <p:txBody>
+          <a:bodyPr wrap="none" rtlCol="0">
+            <a:spAutoFit/>
+          </a:bodyPr>
+          <a:lstStyle/>
+          <a:p>
+            <a:r>
+              <a:rPr lang="en-US" dirty="0"/>
+              <a:t>Recovered atoms</a:t>
+            </a:r>
+          </a:p>
+        </p:txBody>
+      </p:sp>
+      <p:sp>
+        <p:nvSpPr>
+          <p:cNvPr id="4" name="TextBox 3">
+            <a:extLst>
+              <a:ext uri="{FF2B5EF4-FFF2-40B4-BE49-F238E27FC236}">
+                <a16:creationId xmlns:a16="http://schemas.microsoft.com/office/drawing/2014/main" id="{55FBC8FF-4C3F-D942-A167-F1727C88432B}"/>
+              </a:ext>
+            </a:extLst>
+          </p:cNvPr>
+          <p:cNvSpPr txBox="1"/>
+          <p:nvPr/>
+        </p:nvSpPr>
+        <p:spPr>
+          <a:xfrm>
+            <a:off x="5547972" y="3745467"/>
+            <a:ext cx="1589089" cy="369332"/>
+          </a:xfrm>
+          <a:prstGeom prst="rect">
+            <a:avLst/>
+          </a:prstGeom>
+          <a:noFill/>
+        </p:spPr>
+        <p:txBody>
+          <a:bodyPr wrap="none" rtlCol="0">
+            <a:spAutoFit/>
+          </a:bodyPr>
+          <a:lstStyle/>
+          <a:p>
+            <a:r>
+              <a:rPr lang="en-US" dirty="0"/>
+              <a:t>Reconstructed</a:t>
+            </a:r>
+          </a:p>
+        </p:txBody>
+      </p:sp>
+      <p:sp>
+        <p:nvSpPr>
+          <p:cNvPr id="12" name="TextBox 11">
+            <a:extLst>
+              <a:ext uri="{FF2B5EF4-FFF2-40B4-BE49-F238E27FC236}">
+                <a16:creationId xmlns:a16="http://schemas.microsoft.com/office/drawing/2014/main" id="{2540C02B-BA79-FC4E-9328-BAC05A7F3CD1}"/>
+              </a:ext>
+            </a:extLst>
+          </p:cNvPr>
+          <p:cNvSpPr txBox="1"/>
+          <p:nvPr/>
+        </p:nvSpPr>
+        <p:spPr>
+          <a:xfrm>
+            <a:off x="9848988" y="3745467"/>
+            <a:ext cx="655436" cy="369332"/>
+          </a:xfrm>
+          <a:prstGeom prst="rect">
+            <a:avLst/>
+          </a:prstGeom>
+          <a:noFill/>
+        </p:spPr>
+        <p:txBody>
+          <a:bodyPr wrap="none" rtlCol="0">
+            <a:spAutoFit/>
+          </a:bodyPr>
+          <a:lstStyle/>
+          <a:p>
+            <a:r>
+              <a:rPr lang="en-US" dirty="0"/>
+              <a:t>Error</a:t>
+            </a:r>
+          </a:p>
+        </p:txBody>
+      </p:sp>
+    </p:spTree>
+    <p:extLst>
+      <p:ext uri="{BB962C8B-B14F-4D97-AF65-F5344CB8AC3E}">
+        <p14:creationId xmlns:p14="http://schemas.microsoft.com/office/powerpoint/2010/main" val="4168040403"/>
+      </p:ext>
+    </p:extLst>
+  </p:cSld>
+  <p:clrMapOvr>
+    <a:masterClrMapping/>
+  </p:clrMapOvr>
+</p:sld>
+</file>
+
+<file path=ppt/slides/slide14.xml><?xml version="1.0" encoding="utf-8"?>
+<p:sld xmlns:a="http://schemas.openxmlformats.org/drawingml/2006/main" xmlns:r="http://schemas.openxmlformats.org/officeDocument/2006/relationships" xmlns:p="http://schemas.openxmlformats.org/presentationml/2006/main">
+  <p:cSld>
+    <p:spTree>
+      <p:nvGrpSpPr>
+        <p:cNvPr id="1" name=""/>
+        <p:cNvGrpSpPr/>
+        <p:nvPr/>
+      </p:nvGrpSpPr>
+      <p:grpSpPr>
+        <a:xfrm>
+          <a:off x="0" y="0"/>
+          <a:ext cx="0" cy="0"/>
+          <a:chOff x="0" y="0"/>
+          <a:chExt cx="0" cy="0"/>
+        </a:xfrm>
+      </p:grpSpPr>
+      <p:pic>
+        <p:nvPicPr>
           <p:cNvPr id="3" name="Picture 2">
             <a:extLst>
               <a:ext uri="{FF2B5EF4-FFF2-40B4-BE49-F238E27FC236}">
@@ -4307,7 +4745,7 @@
 </p:sld>
 </file>
 
-<file path=ppt/slides/slide13.xml><?xml version="1.0" encoding="utf-8"?>
+<file path=ppt/slides/slide15.xml><?xml version="1.0" encoding="utf-8"?>
 <p:sld xmlns:a="http://schemas.openxmlformats.org/drawingml/2006/main" xmlns:r="http://schemas.openxmlformats.org/officeDocument/2006/relationships" xmlns:p="http://schemas.openxmlformats.org/presentationml/2006/main">
   <p:cSld>
     <p:spTree>
@@ -6786,6 +7224,141 @@
           </a:p>
         </p:txBody>
       </p:sp>
+      <p:pic>
+        <p:nvPicPr>
+          <p:cNvPr id="5" name="Picture 4">
+            <a:extLst>
+              <a:ext uri="{FF2B5EF4-FFF2-40B4-BE49-F238E27FC236}">
+                <a16:creationId xmlns:a16="http://schemas.microsoft.com/office/drawing/2014/main" id="{29560555-7FBF-8F47-8B7F-CBDE3746B3D0}"/>
+              </a:ext>
+            </a:extLst>
+          </p:cNvPr>
+          <p:cNvPicPr>
+            <a:picLocks noChangeAspect="1"/>
+          </p:cNvPicPr>
+          <p:nvPr/>
+        </p:nvPicPr>
+        <p:blipFill>
+          <a:blip r:embed="rId6"/>
+          <a:stretch>
+            <a:fillRect/>
+          </a:stretch>
+        </p:blipFill>
+        <p:spPr>
+          <a:xfrm>
+            <a:off x="6196405" y="5177198"/>
+            <a:ext cx="1937836" cy="1602550"/>
+          </a:xfrm>
+          <a:prstGeom prst="rect">
+            <a:avLst/>
+          </a:prstGeom>
+        </p:spPr>
+      </p:pic>
+      <p:pic>
+        <p:nvPicPr>
+          <p:cNvPr id="7" name="Picture 6">
+            <a:extLst>
+              <a:ext uri="{FF2B5EF4-FFF2-40B4-BE49-F238E27FC236}">
+                <a16:creationId xmlns:a16="http://schemas.microsoft.com/office/drawing/2014/main" id="{CADADA41-388C-A34D-A840-1CF90DCABEF7}"/>
+              </a:ext>
+            </a:extLst>
+          </p:cNvPr>
+          <p:cNvPicPr>
+            <a:picLocks noChangeAspect="1"/>
+          </p:cNvPicPr>
+          <p:nvPr/>
+        </p:nvPicPr>
+        <p:blipFill>
+          <a:blip r:embed="rId7"/>
+          <a:stretch>
+            <a:fillRect/>
+          </a:stretch>
+        </p:blipFill>
+        <p:spPr>
+          <a:xfrm>
+            <a:off x="3628569" y="5271302"/>
+            <a:ext cx="2116015" cy="1508446"/>
+          </a:xfrm>
+          <a:prstGeom prst="rect">
+            <a:avLst/>
+          </a:prstGeom>
+        </p:spPr>
+      </p:pic>
+      <p:sp>
+        <p:nvSpPr>
+          <p:cNvPr id="23" name="Rectangle 22">
+            <a:extLst>
+              <a:ext uri="{FF2B5EF4-FFF2-40B4-BE49-F238E27FC236}">
+                <a16:creationId xmlns:a16="http://schemas.microsoft.com/office/drawing/2014/main" id="{E079B3F9-F667-BB49-9F8D-A12FD33E2A4C}"/>
+              </a:ext>
+            </a:extLst>
+          </p:cNvPr>
+          <p:cNvSpPr/>
+          <p:nvPr/>
+        </p:nvSpPr>
+        <p:spPr>
+          <a:xfrm>
+            <a:off x="8139606" y="5729018"/>
+            <a:ext cx="3523850" cy="307777"/>
+          </a:xfrm>
+          <a:prstGeom prst="rect">
+            <a:avLst/>
+          </a:prstGeom>
+        </p:spPr>
+        <p:txBody>
+          <a:bodyPr wrap="none">
+            <a:spAutoFit/>
+          </a:bodyPr>
+          <a:lstStyle/>
+          <a:p>
+            <a:r>
+              <a:rPr lang="en-US" sz="1400" dirty="0"/>
+              <a:t>Reconstruction error:0.002015971351983264</a:t>
+            </a:r>
+          </a:p>
+        </p:txBody>
+      </p:sp>
+      <p:sp>
+        <p:nvSpPr>
+          <p:cNvPr id="11" name="Rectangle 10">
+            <a:extLst>
+              <a:ext uri="{FF2B5EF4-FFF2-40B4-BE49-F238E27FC236}">
+                <a16:creationId xmlns:a16="http://schemas.microsoft.com/office/drawing/2014/main" id="{8F86D258-C0B6-3B4D-8950-063DAA4CA49A}"/>
+              </a:ext>
+            </a:extLst>
+          </p:cNvPr>
+          <p:cNvSpPr/>
+          <p:nvPr/>
+        </p:nvSpPr>
+        <p:spPr>
+          <a:xfrm>
+            <a:off x="6826481" y="5345320"/>
+            <a:ext cx="1152880" cy="338554"/>
+          </a:xfrm>
+          <a:prstGeom prst="rect">
+            <a:avLst/>
+          </a:prstGeom>
+        </p:spPr>
+        <p:txBody>
+          <a:bodyPr wrap="none">
+            <a:spAutoFit/>
+          </a:bodyPr>
+          <a:lstStyle/>
+          <a:p>
+            <a:r>
+              <a:rPr lang="en-US" sz="1600" dirty="0" err="1"/>
+              <a:t>lamda</a:t>
+            </a:r>
+            <a:r>
+              <a:rPr lang="en-US" sz="1600" dirty="0"/>
+              <a:t> = .01</a:t>
+            </a:r>
+            <a:endParaRPr lang="en-US" sz="1600" b="0" dirty="0">
+              <a:effectLst/>
+            </a:endParaRPr>
+          </a:p>
+        </p:txBody>
+      </p:sp>
     </p:spTree>
     <p:extLst>
       <p:ext uri="{BB962C8B-B14F-4D97-AF65-F5344CB8AC3E}">
@@ -6818,10 +7391,10 @@
       </p:grpSpPr>
       <p:pic>
         <p:nvPicPr>
-          <p:cNvPr id="3" name="Picture 2">
-            <a:extLst>
-              <a:ext uri="{FF2B5EF4-FFF2-40B4-BE49-F238E27FC236}">
-                <a16:creationId xmlns:a16="http://schemas.microsoft.com/office/drawing/2014/main" id="{5757173F-9581-C842-B61A-7AFB348373C8}"/>
+          <p:cNvPr id="10" name="Picture 9">
+            <a:extLst>
+              <a:ext uri="{FF2B5EF4-FFF2-40B4-BE49-F238E27FC236}">
+                <a16:creationId xmlns:a16="http://schemas.microsoft.com/office/drawing/2014/main" id="{91F29965-EB51-4647-ABEC-CF582E2E3FD3}"/>
               </a:ext>
             </a:extLst>
           </p:cNvPr>
@@ -6838,8 +7411,8 @@
         </p:blipFill>
         <p:spPr>
           <a:xfrm>
-            <a:off x="779548" y="559292"/>
-            <a:ext cx="2712682" cy="2003073"/>
+            <a:off x="6860215" y="1190022"/>
+            <a:ext cx="4454950" cy="3218344"/>
           </a:xfrm>
           <a:prstGeom prst="rect">
             <a:avLst/>
@@ -6851,7 +7424,7 @@
           <p:cNvPr id="11" name="Picture 10">
             <a:extLst>
               <a:ext uri="{FF2B5EF4-FFF2-40B4-BE49-F238E27FC236}">
-                <a16:creationId xmlns:a16="http://schemas.microsoft.com/office/drawing/2014/main" id="{F719A4FB-AAB3-1448-9BF1-01C03E3DAC5A}"/>
+                <a16:creationId xmlns:a16="http://schemas.microsoft.com/office/drawing/2014/main" id="{28D4A074-320E-3949-BE0B-1E5A44768291}"/>
               </a:ext>
             </a:extLst>
           </p:cNvPr>
@@ -6868,451 +7441,18 @@
         </p:blipFill>
         <p:spPr>
           <a:xfrm>
-            <a:off x="4046705" y="559292"/>
-            <a:ext cx="2548648" cy="1809279"/>
+            <a:off x="552324" y="1190022"/>
+            <a:ext cx="4876282" cy="3600697"/>
           </a:xfrm>
           <a:prstGeom prst="rect">
             <a:avLst/>
           </a:prstGeom>
         </p:spPr>
       </p:pic>
-      <p:sp>
-        <p:nvSpPr>
-          <p:cNvPr id="12" name="Rectangle 11">
-            <a:extLst>
-              <a:ext uri="{FF2B5EF4-FFF2-40B4-BE49-F238E27FC236}">
-                <a16:creationId xmlns:a16="http://schemas.microsoft.com/office/drawing/2014/main" id="{85F79A9A-EF02-2947-8B4E-75B23C1E93AD}"/>
-              </a:ext>
-            </a:extLst>
-          </p:cNvPr>
-          <p:cNvSpPr/>
-          <p:nvPr/>
-        </p:nvSpPr>
-        <p:spPr>
-          <a:xfrm>
-            <a:off x="7023836" y="1125377"/>
-            <a:ext cx="3939155" cy="338554"/>
-          </a:xfrm>
-          <a:prstGeom prst="rect">
-            <a:avLst/>
-          </a:prstGeom>
-        </p:spPr>
-        <p:txBody>
-          <a:bodyPr wrap="none">
-            <a:spAutoFit/>
-          </a:bodyPr>
-          <a:lstStyle/>
-          <a:p>
-            <a:r>
-              <a:rPr lang="en-US" sz="1600" dirty="0"/>
-              <a:t>Reconstruction Error: 0.09860999176138388</a:t>
-            </a:r>
-          </a:p>
-        </p:txBody>
-      </p:sp>
-      <p:pic>
-        <p:nvPicPr>
-          <p:cNvPr id="17" name="Picture 16">
-            <a:extLst>
-              <a:ext uri="{FF2B5EF4-FFF2-40B4-BE49-F238E27FC236}">
-                <a16:creationId xmlns:a16="http://schemas.microsoft.com/office/drawing/2014/main" id="{DEB88461-00B4-CF4E-8CB2-3EFB618270C9}"/>
-              </a:ext>
-            </a:extLst>
-          </p:cNvPr>
-          <p:cNvPicPr>
-            <a:picLocks noChangeAspect="1"/>
-          </p:cNvPicPr>
-          <p:nvPr/>
-        </p:nvPicPr>
-        <p:blipFill>
-          <a:blip r:embed="rId4"/>
-          <a:stretch>
-            <a:fillRect/>
-          </a:stretch>
-        </p:blipFill>
-        <p:spPr>
-          <a:xfrm>
-            <a:off x="4221805" y="2883861"/>
-            <a:ext cx="2495559" cy="1809280"/>
-          </a:xfrm>
-          <a:prstGeom prst="rect">
-            <a:avLst/>
-          </a:prstGeom>
-        </p:spPr>
-      </p:pic>
-      <p:pic>
-        <p:nvPicPr>
-          <p:cNvPr id="23" name="Picture 22">
-            <a:extLst>
-              <a:ext uri="{FF2B5EF4-FFF2-40B4-BE49-F238E27FC236}">
-                <a16:creationId xmlns:a16="http://schemas.microsoft.com/office/drawing/2014/main" id="{FD984DA3-CB5A-C54E-8FF9-438941019FF9}"/>
-              </a:ext>
-            </a:extLst>
-          </p:cNvPr>
-          <p:cNvPicPr>
-            <a:picLocks noChangeAspect="1"/>
-          </p:cNvPicPr>
-          <p:nvPr/>
-        </p:nvPicPr>
-        <p:blipFill>
-          <a:blip r:embed="rId5"/>
-          <a:stretch>
-            <a:fillRect/>
-          </a:stretch>
-        </p:blipFill>
-        <p:spPr>
-          <a:xfrm>
-            <a:off x="870577" y="2883860"/>
-            <a:ext cx="2621653" cy="1911440"/>
-          </a:xfrm>
-          <a:prstGeom prst="rect">
-            <a:avLst/>
-          </a:prstGeom>
-        </p:spPr>
-      </p:pic>
-      <p:sp>
-        <p:nvSpPr>
-          <p:cNvPr id="24" name="Rectangle 23">
-            <a:extLst>
-              <a:ext uri="{FF2B5EF4-FFF2-40B4-BE49-F238E27FC236}">
-                <a16:creationId xmlns:a16="http://schemas.microsoft.com/office/drawing/2014/main" id="{6C3ED802-F015-7843-95CE-3AAE5359D691}"/>
-              </a:ext>
-            </a:extLst>
-          </p:cNvPr>
-          <p:cNvSpPr/>
-          <p:nvPr/>
-        </p:nvSpPr>
-        <p:spPr>
-          <a:xfrm>
-            <a:off x="7023835" y="3788501"/>
-            <a:ext cx="3939155" cy="338554"/>
-          </a:xfrm>
-          <a:prstGeom prst="rect">
-            <a:avLst/>
-          </a:prstGeom>
-        </p:spPr>
-        <p:txBody>
-          <a:bodyPr wrap="none">
-            <a:spAutoFit/>
-          </a:bodyPr>
-          <a:lstStyle/>
-          <a:p>
-            <a:r>
-              <a:rPr lang="en-US" sz="1600" dirty="0"/>
-              <a:t>Reconstruction Error: 0.16966901383199118</a:t>
-            </a:r>
-          </a:p>
-        </p:txBody>
-      </p:sp>
-      <p:sp>
-        <p:nvSpPr>
-          <p:cNvPr id="25" name="TextBox 24">
-            <a:extLst>
-              <a:ext uri="{FF2B5EF4-FFF2-40B4-BE49-F238E27FC236}">
-                <a16:creationId xmlns:a16="http://schemas.microsoft.com/office/drawing/2014/main" id="{FC12410A-5A53-5440-AEA5-5B82EE33C35C}"/>
-              </a:ext>
-            </a:extLst>
-          </p:cNvPr>
-          <p:cNvSpPr txBox="1"/>
-          <p:nvPr/>
-        </p:nvSpPr>
-        <p:spPr>
-          <a:xfrm>
-            <a:off x="6995751" y="3222414"/>
-            <a:ext cx="3939155" cy="338554"/>
-          </a:xfrm>
-          <a:prstGeom prst="rect">
-            <a:avLst/>
-          </a:prstGeom>
-          <a:noFill/>
-        </p:spPr>
-        <p:txBody>
-          <a:bodyPr wrap="square" rtlCol="0">
-            <a:spAutoFit/>
-          </a:bodyPr>
-          <a:lstStyle/>
-          <a:p>
-            <a:r>
-              <a:rPr lang="en-US" sz="1600" dirty="0"/>
-              <a:t>The minimum possible of Epsilon was 0.7</a:t>
-            </a:r>
-          </a:p>
-        </p:txBody>
-      </p:sp>
-      <p:sp>
-        <p:nvSpPr>
-          <p:cNvPr id="26" name="TextBox 25">
-            <a:extLst>
-              <a:ext uri="{FF2B5EF4-FFF2-40B4-BE49-F238E27FC236}">
-                <a16:creationId xmlns:a16="http://schemas.microsoft.com/office/drawing/2014/main" id="{BD548D13-E139-1E43-AB38-4594428A6C54}"/>
-              </a:ext>
-            </a:extLst>
-          </p:cNvPr>
-          <p:cNvSpPr txBox="1"/>
-          <p:nvPr/>
-        </p:nvSpPr>
-        <p:spPr>
-          <a:xfrm>
-            <a:off x="321013" y="1410511"/>
-            <a:ext cx="399468" cy="369332"/>
-          </a:xfrm>
-          <a:prstGeom prst="rect">
-            <a:avLst/>
-          </a:prstGeom>
-          <a:noFill/>
-        </p:spPr>
-        <p:txBody>
-          <a:bodyPr wrap="none" rtlCol="0">
-            <a:spAutoFit/>
-          </a:bodyPr>
-          <a:lstStyle/>
-          <a:p>
-            <a:r>
-              <a:rPr lang="en-US" dirty="0"/>
-              <a:t>L2</a:t>
-            </a:r>
-          </a:p>
-        </p:txBody>
-      </p:sp>
-      <p:sp>
-        <p:nvSpPr>
-          <p:cNvPr id="27" name="TextBox 26">
-            <a:extLst>
-              <a:ext uri="{FF2B5EF4-FFF2-40B4-BE49-F238E27FC236}">
-                <a16:creationId xmlns:a16="http://schemas.microsoft.com/office/drawing/2014/main" id="{4687AC32-F173-0A48-96C3-91944EBB45FB}"/>
-              </a:ext>
-            </a:extLst>
-          </p:cNvPr>
-          <p:cNvSpPr txBox="1"/>
-          <p:nvPr/>
-        </p:nvSpPr>
-        <p:spPr>
-          <a:xfrm>
-            <a:off x="321013" y="3552057"/>
-            <a:ext cx="399468" cy="369332"/>
-          </a:xfrm>
-          <a:prstGeom prst="rect">
-            <a:avLst/>
-          </a:prstGeom>
-          <a:noFill/>
-        </p:spPr>
-        <p:txBody>
-          <a:bodyPr wrap="none" rtlCol="0">
-            <a:spAutoFit/>
-          </a:bodyPr>
-          <a:lstStyle/>
-          <a:p>
-            <a:r>
-              <a:rPr lang="en-US" dirty="0"/>
-              <a:t>L1</a:t>
-            </a:r>
-          </a:p>
-        </p:txBody>
-      </p:sp>
-      <p:pic>
-        <p:nvPicPr>
-          <p:cNvPr id="29" name="Picture 28">
-            <a:extLst>
-              <a:ext uri="{FF2B5EF4-FFF2-40B4-BE49-F238E27FC236}">
-                <a16:creationId xmlns:a16="http://schemas.microsoft.com/office/drawing/2014/main" id="{303ABE75-E4F6-F940-9481-FFDE94AA8CDA}"/>
-              </a:ext>
-            </a:extLst>
-          </p:cNvPr>
-          <p:cNvPicPr>
-            <a:picLocks noChangeAspect="1"/>
-          </p:cNvPicPr>
-          <p:nvPr/>
-        </p:nvPicPr>
-        <p:blipFill>
-          <a:blip r:embed="rId6"/>
-          <a:stretch>
-            <a:fillRect/>
-          </a:stretch>
-        </p:blipFill>
-        <p:spPr>
-          <a:xfrm>
-            <a:off x="4296279" y="5123692"/>
-            <a:ext cx="2346609" cy="1695237"/>
-          </a:xfrm>
-          <a:prstGeom prst="rect">
-            <a:avLst/>
-          </a:prstGeom>
-        </p:spPr>
-      </p:pic>
-      <p:pic>
-        <p:nvPicPr>
-          <p:cNvPr id="31" name="Picture 30">
-            <a:extLst>
-              <a:ext uri="{FF2B5EF4-FFF2-40B4-BE49-F238E27FC236}">
-                <a16:creationId xmlns:a16="http://schemas.microsoft.com/office/drawing/2014/main" id="{A2B283D8-B451-DE4F-91C6-79B296C33CFB}"/>
-              </a:ext>
-            </a:extLst>
-          </p:cNvPr>
-          <p:cNvPicPr>
-            <a:picLocks noChangeAspect="1"/>
-          </p:cNvPicPr>
-          <p:nvPr/>
-        </p:nvPicPr>
-        <p:blipFill>
-          <a:blip r:embed="rId7"/>
-          <a:stretch>
-            <a:fillRect/>
-          </a:stretch>
-        </p:blipFill>
-        <p:spPr>
-          <a:xfrm>
-            <a:off x="923688" y="5022992"/>
-            <a:ext cx="2568542" cy="1896638"/>
-          </a:xfrm>
-          <a:prstGeom prst="rect">
-            <a:avLst/>
-          </a:prstGeom>
-        </p:spPr>
-      </p:pic>
-      <p:sp>
-        <p:nvSpPr>
-          <p:cNvPr id="32" name="TextBox 31">
-            <a:extLst>
-              <a:ext uri="{FF2B5EF4-FFF2-40B4-BE49-F238E27FC236}">
-                <a16:creationId xmlns:a16="http://schemas.microsoft.com/office/drawing/2014/main" id="{1F983E7C-A9C1-D942-8A98-6428BF8FFC61}"/>
-              </a:ext>
-            </a:extLst>
-          </p:cNvPr>
-          <p:cNvSpPr txBox="1"/>
-          <p:nvPr/>
-        </p:nvSpPr>
-        <p:spPr>
-          <a:xfrm>
-            <a:off x="144307" y="5601979"/>
-            <a:ext cx="779381" cy="369332"/>
-          </a:xfrm>
-          <a:prstGeom prst="rect">
-            <a:avLst/>
-          </a:prstGeom>
-          <a:noFill/>
-        </p:spPr>
-        <p:txBody>
-          <a:bodyPr wrap="none" rtlCol="0">
-            <a:spAutoFit/>
-          </a:bodyPr>
-          <a:lstStyle/>
-          <a:p>
-            <a:r>
-              <a:rPr lang="en-US" dirty="0"/>
-              <a:t>LASSO</a:t>
-            </a:r>
-          </a:p>
-        </p:txBody>
-      </p:sp>
-      <p:sp>
-        <p:nvSpPr>
-          <p:cNvPr id="33" name="Rectangle 32">
-            <a:extLst>
-              <a:ext uri="{FF2B5EF4-FFF2-40B4-BE49-F238E27FC236}">
-                <a16:creationId xmlns:a16="http://schemas.microsoft.com/office/drawing/2014/main" id="{0EF82C53-2CCC-3740-91DF-91BF308F4506}"/>
-              </a:ext>
-            </a:extLst>
-          </p:cNvPr>
-          <p:cNvSpPr/>
-          <p:nvPr/>
-        </p:nvSpPr>
-        <p:spPr>
-          <a:xfrm>
-            <a:off x="5174216" y="5123692"/>
-            <a:ext cx="1468672" cy="338554"/>
-          </a:xfrm>
-          <a:prstGeom prst="rect">
-            <a:avLst/>
-          </a:prstGeom>
-        </p:spPr>
-        <p:txBody>
-          <a:bodyPr wrap="none">
-            <a:spAutoFit/>
-          </a:bodyPr>
-          <a:lstStyle/>
-          <a:p>
-            <a:r>
-              <a:rPr lang="en-US" sz="1600" b="0" dirty="0">
-                <a:effectLst/>
-              </a:rPr>
-              <a:t>lambda = 0.005</a:t>
-            </a:r>
-          </a:p>
-        </p:txBody>
-      </p:sp>
-      <p:sp>
-        <p:nvSpPr>
-          <p:cNvPr id="34" name="Rectangle 33">
-            <a:extLst>
-              <a:ext uri="{FF2B5EF4-FFF2-40B4-BE49-F238E27FC236}">
-                <a16:creationId xmlns:a16="http://schemas.microsoft.com/office/drawing/2014/main" id="{5D8EB579-C4B0-A641-869C-D7C1ED6CCEE7}"/>
-              </a:ext>
-            </a:extLst>
-          </p:cNvPr>
-          <p:cNvSpPr/>
-          <p:nvPr/>
-        </p:nvSpPr>
-        <p:spPr>
-          <a:xfrm>
-            <a:off x="7023835" y="5682753"/>
-            <a:ext cx="3470950" cy="307777"/>
-          </a:xfrm>
-          <a:prstGeom prst="rect">
-            <a:avLst/>
-          </a:prstGeom>
-        </p:spPr>
-        <p:txBody>
-          <a:bodyPr wrap="none">
-            <a:spAutoFit/>
-          </a:bodyPr>
-          <a:lstStyle/>
-          <a:p>
-            <a:r>
-              <a:rPr lang="en-US" sz="1400" dirty="0"/>
-              <a:t>Reconstruction Error: 0.10372515231840763</a:t>
-            </a:r>
-          </a:p>
-        </p:txBody>
-      </p:sp>
-      <p:sp>
-        <p:nvSpPr>
-          <p:cNvPr id="16" name="TextBox 15">
-            <a:extLst>
-              <a:ext uri="{FF2B5EF4-FFF2-40B4-BE49-F238E27FC236}">
-                <a16:creationId xmlns:a16="http://schemas.microsoft.com/office/drawing/2014/main" id="{29175E68-E4EB-D249-867C-A98D0099FB1E}"/>
-              </a:ext>
-            </a:extLst>
-          </p:cNvPr>
-          <p:cNvSpPr txBox="1"/>
-          <p:nvPr/>
-        </p:nvSpPr>
-        <p:spPr>
-          <a:xfrm>
-            <a:off x="21425" y="69378"/>
-            <a:ext cx="3948389" cy="400110"/>
-          </a:xfrm>
-          <a:prstGeom prst="rect">
-            <a:avLst/>
-          </a:prstGeom>
-          <a:noFill/>
-        </p:spPr>
-        <p:txBody>
-          <a:bodyPr wrap="none" rtlCol="0">
-            <a:spAutoFit/>
-          </a:bodyPr>
-          <a:lstStyle/>
-          <a:p>
-            <a:r>
-              <a:rPr lang="en-US" sz="2000" dirty="0"/>
-              <a:t>Toy problem 1: noisy measurements</a:t>
-            </a:r>
-          </a:p>
-        </p:txBody>
-      </p:sp>
     </p:spTree>
     <p:extLst>
       <p:ext uri="{BB962C8B-B14F-4D97-AF65-F5344CB8AC3E}">
-        <p14:creationId xmlns:p14="http://schemas.microsoft.com/office/powerpoint/2010/main" val="545929587"/>
+        <p14:creationId xmlns:p14="http://schemas.microsoft.com/office/powerpoint/2010/main" val="3837333539"/>
       </p:ext>
     </p:extLst>
   </p:cSld>
@@ -7341,10 +7481,10 @@
       </p:grpSpPr>
       <p:pic>
         <p:nvPicPr>
-          <p:cNvPr id="4" name="Picture 3">
-            <a:extLst>
-              <a:ext uri="{FF2B5EF4-FFF2-40B4-BE49-F238E27FC236}">
-                <a16:creationId xmlns:a16="http://schemas.microsoft.com/office/drawing/2014/main" id="{2E519EC8-71CA-D840-9C30-63E2D2BFF5E8}"/>
+          <p:cNvPr id="3" name="Picture 2">
+            <a:extLst>
+              <a:ext uri="{FF2B5EF4-FFF2-40B4-BE49-F238E27FC236}">
+                <a16:creationId xmlns:a16="http://schemas.microsoft.com/office/drawing/2014/main" id="{5757173F-9581-C842-B61A-7AFB348373C8}"/>
               </a:ext>
             </a:extLst>
           </p:cNvPr>
@@ -7361,55 +7501,20 @@
         </p:blipFill>
         <p:spPr>
           <a:xfrm>
-            <a:off x="8711501" y="714037"/>
-            <a:ext cx="2214411" cy="2179675"/>
+            <a:off x="779548" y="559292"/>
+            <a:ext cx="2712682" cy="2003073"/>
           </a:xfrm>
           <a:prstGeom prst="rect">
             <a:avLst/>
           </a:prstGeom>
         </p:spPr>
       </p:pic>
-      <p:sp>
-        <p:nvSpPr>
-          <p:cNvPr id="7" name="TextBox 6">
-            <a:extLst>
-              <a:ext uri="{FF2B5EF4-FFF2-40B4-BE49-F238E27FC236}">
-                <a16:creationId xmlns:a16="http://schemas.microsoft.com/office/drawing/2014/main" id="{DF922F77-F3B7-5D46-B1F0-1F1C91AE1E64}"/>
-              </a:ext>
-            </a:extLst>
-          </p:cNvPr>
-          <p:cNvSpPr txBox="1"/>
-          <p:nvPr/>
-        </p:nvSpPr>
-        <p:spPr>
-          <a:xfrm>
-            <a:off x="21425" y="69378"/>
-            <a:ext cx="5818452" cy="400110"/>
-          </a:xfrm>
-          <a:prstGeom prst="rect">
-            <a:avLst/>
-          </a:prstGeom>
-          <a:noFill/>
-        </p:spPr>
-        <p:txBody>
-          <a:bodyPr wrap="none" rtlCol="0">
-            <a:spAutoFit/>
-          </a:bodyPr>
-          <a:lstStyle/>
-          <a:p>
-            <a:r>
-              <a:rPr lang="en-US" sz="2000" dirty="0"/>
-              <a:t>Toy problem 2: heat transfer in heterogenous material</a:t>
-            </a:r>
-          </a:p>
-        </p:txBody>
-      </p:sp>
       <p:pic>
         <p:nvPicPr>
-          <p:cNvPr id="2" name="Picture 1">
-            <a:extLst>
-              <a:ext uri="{FF2B5EF4-FFF2-40B4-BE49-F238E27FC236}">
-                <a16:creationId xmlns:a16="http://schemas.microsoft.com/office/drawing/2014/main" id="{C07CB02C-0611-B440-9092-3A860993F645}"/>
+          <p:cNvPr id="11" name="Picture 10">
+            <a:extLst>
+              <a:ext uri="{FF2B5EF4-FFF2-40B4-BE49-F238E27FC236}">
+                <a16:creationId xmlns:a16="http://schemas.microsoft.com/office/drawing/2014/main" id="{F719A4FB-AAB3-1448-9BF1-01C03E3DAC5A}"/>
               </a:ext>
             </a:extLst>
           </p:cNvPr>
@@ -7426,248 +7531,54 @@
         </p:blipFill>
         <p:spPr>
           <a:xfrm>
-            <a:off x="1266088" y="1439517"/>
-            <a:ext cx="4429061" cy="728713"/>
+            <a:off x="4046705" y="559292"/>
+            <a:ext cx="2548648" cy="1809279"/>
           </a:xfrm>
           <a:prstGeom prst="rect">
             <a:avLst/>
           </a:prstGeom>
         </p:spPr>
       </p:pic>
-      <p:cxnSp>
-        <p:nvCxnSpPr>
-          <p:cNvPr id="5" name="Straight Arrow Connector 4">
-            <a:extLst>
-              <a:ext uri="{FF2B5EF4-FFF2-40B4-BE49-F238E27FC236}">
-                <a16:creationId xmlns:a16="http://schemas.microsoft.com/office/drawing/2014/main" id="{3A7C893C-37A5-6444-8120-0DE7E677E340}"/>
-              </a:ext>
-            </a:extLst>
-          </p:cNvPr>
-          <p:cNvCxnSpPr>
-            <a:cxnSpLocks/>
-          </p:cNvCxnSpPr>
-          <p:nvPr/>
-        </p:nvCxnSpPr>
-        <p:spPr>
-          <a:xfrm flipH="1" flipV="1">
-            <a:off x="8133907" y="1318437"/>
-            <a:ext cx="850605" cy="340243"/>
-          </a:xfrm>
-          <a:prstGeom prst="straightConnector1">
-            <a:avLst/>
-          </a:prstGeom>
-          <a:ln w="25400">
-            <a:solidFill>
-              <a:schemeClr val="tx1"/>
-            </a:solidFill>
-            <a:tailEnd type="triangle"/>
-          </a:ln>
-        </p:spPr>
-        <p:style>
-          <a:lnRef idx="1">
-            <a:schemeClr val="accent1"/>
-          </a:lnRef>
-          <a:fillRef idx="0">
-            <a:schemeClr val="accent1"/>
-          </a:fillRef>
-          <a:effectRef idx="0">
-            <a:schemeClr val="accent1"/>
-          </a:effectRef>
-          <a:fontRef idx="minor">
-            <a:schemeClr val="tx1"/>
-          </a:fontRef>
-        </p:style>
-      </p:cxnSp>
-      <p:sp>
-        <p:nvSpPr>
-          <p:cNvPr id="13" name="TextBox 12">
-            <a:extLst>
-              <a:ext uri="{FF2B5EF4-FFF2-40B4-BE49-F238E27FC236}">
-                <a16:creationId xmlns:a16="http://schemas.microsoft.com/office/drawing/2014/main" id="{5B58523F-2788-9F4B-90AA-CF73D095E134}"/>
-              </a:ext>
-            </a:extLst>
-          </p:cNvPr>
-          <p:cNvSpPr txBox="1"/>
-          <p:nvPr/>
-        </p:nvSpPr>
-        <p:spPr>
-          <a:xfrm>
-            <a:off x="6944023" y="1016741"/>
-            <a:ext cx="1615186" cy="276999"/>
-          </a:xfrm>
-          <a:prstGeom prst="rect">
-            <a:avLst/>
-          </a:prstGeom>
-          <a:noFill/>
-        </p:spPr>
-        <p:txBody>
-          <a:bodyPr wrap="none" rtlCol="0">
+      <p:sp>
+        <p:nvSpPr>
+          <p:cNvPr id="12" name="Rectangle 11">
+            <a:extLst>
+              <a:ext uri="{FF2B5EF4-FFF2-40B4-BE49-F238E27FC236}">
+                <a16:creationId xmlns:a16="http://schemas.microsoft.com/office/drawing/2014/main" id="{85F79A9A-EF02-2947-8B4E-75B23C1E93AD}"/>
+              </a:ext>
+            </a:extLst>
+          </p:cNvPr>
+          <p:cNvSpPr/>
+          <p:nvPr/>
+        </p:nvSpPr>
+        <p:spPr>
+          <a:xfrm>
+            <a:off x="7023836" y="1125377"/>
+            <a:ext cx="3939155" cy="338554"/>
+          </a:xfrm>
+          <a:prstGeom prst="rect">
+            <a:avLst/>
+          </a:prstGeom>
+        </p:spPr>
+        <p:txBody>
+          <a:bodyPr wrap="none">
             <a:spAutoFit/>
           </a:bodyPr>
           <a:lstStyle/>
           <a:p>
             <a:r>
-              <a:rPr lang="en-US" sz="1200" dirty="0"/>
-              <a:t>Fixed temperature to 1</a:t>
-            </a:r>
-          </a:p>
-        </p:txBody>
-      </p:sp>
-      <p:cxnSp>
-        <p:nvCxnSpPr>
-          <p:cNvPr id="14" name="Straight Arrow Connector 13">
-            <a:extLst>
-              <a:ext uri="{FF2B5EF4-FFF2-40B4-BE49-F238E27FC236}">
-                <a16:creationId xmlns:a16="http://schemas.microsoft.com/office/drawing/2014/main" id="{7E56E4D0-DC68-DE4C-96DC-BAD3583584C2}"/>
-              </a:ext>
-            </a:extLst>
-          </p:cNvPr>
-          <p:cNvCxnSpPr>
-            <a:cxnSpLocks/>
-          </p:cNvCxnSpPr>
-          <p:nvPr/>
-        </p:nvCxnSpPr>
-        <p:spPr>
-          <a:xfrm flipV="1">
-            <a:off x="10822173" y="710605"/>
-            <a:ext cx="404958" cy="478744"/>
-          </a:xfrm>
-          <a:prstGeom prst="straightConnector1">
-            <a:avLst/>
-          </a:prstGeom>
-          <a:ln w="25400">
-            <a:solidFill>
-              <a:schemeClr val="tx1"/>
-            </a:solidFill>
-            <a:tailEnd type="triangle"/>
-          </a:ln>
-        </p:spPr>
-        <p:style>
-          <a:lnRef idx="1">
-            <a:schemeClr val="accent1"/>
-          </a:lnRef>
-          <a:fillRef idx="0">
-            <a:schemeClr val="accent1"/>
-          </a:fillRef>
-          <a:effectRef idx="0">
-            <a:schemeClr val="accent1"/>
-          </a:effectRef>
-          <a:fontRef idx="minor">
-            <a:schemeClr val="tx1"/>
-          </a:fontRef>
-        </p:style>
-      </p:cxnSp>
-      <p:sp>
-        <p:nvSpPr>
-          <p:cNvPr id="16" name="TextBox 15">
-            <a:extLst>
-              <a:ext uri="{FF2B5EF4-FFF2-40B4-BE49-F238E27FC236}">
-                <a16:creationId xmlns:a16="http://schemas.microsoft.com/office/drawing/2014/main" id="{8280B503-8DBB-594D-82C8-F44E9F288FF6}"/>
-              </a:ext>
-            </a:extLst>
-          </p:cNvPr>
-          <p:cNvSpPr txBox="1"/>
-          <p:nvPr/>
-        </p:nvSpPr>
-        <p:spPr>
-          <a:xfrm>
-            <a:off x="10576814" y="330988"/>
-            <a:ext cx="1615186" cy="276999"/>
-          </a:xfrm>
-          <a:prstGeom prst="rect">
-            <a:avLst/>
-          </a:prstGeom>
-          <a:noFill/>
-        </p:spPr>
-        <p:txBody>
-          <a:bodyPr wrap="none" rtlCol="0">
-            <a:spAutoFit/>
-          </a:bodyPr>
-          <a:lstStyle/>
-          <a:p>
-            <a:r>
-              <a:rPr lang="en-US" sz="1200" dirty="0"/>
-              <a:t>Fixed temperature to 0</a:t>
-            </a:r>
-          </a:p>
-        </p:txBody>
-      </p:sp>
-      <p:sp>
-        <p:nvSpPr>
-          <p:cNvPr id="17" name="TextBox 16">
-            <a:extLst>
-              <a:ext uri="{FF2B5EF4-FFF2-40B4-BE49-F238E27FC236}">
-                <a16:creationId xmlns:a16="http://schemas.microsoft.com/office/drawing/2014/main" id="{109B8C76-2F74-BA40-8C2F-35F4160DD056}"/>
-              </a:ext>
-            </a:extLst>
-          </p:cNvPr>
-          <p:cNvSpPr txBox="1"/>
-          <p:nvPr/>
-        </p:nvSpPr>
-        <p:spPr>
-          <a:xfrm>
-            <a:off x="340241" y="832075"/>
-            <a:ext cx="3455882" cy="369332"/>
-          </a:xfrm>
-          <a:prstGeom prst="rect">
-            <a:avLst/>
-          </a:prstGeom>
-          <a:noFill/>
-        </p:spPr>
-        <p:txBody>
-          <a:bodyPr wrap="none" rtlCol="0">
-            <a:spAutoFit/>
-          </a:bodyPr>
-          <a:lstStyle/>
-          <a:p>
-            <a:r>
-              <a:rPr lang="en-US" dirty="0"/>
-              <a:t>Governing equation: parabolic PDE</a:t>
-            </a:r>
-          </a:p>
-        </p:txBody>
-      </p:sp>
-      <p:sp>
-        <p:nvSpPr>
-          <p:cNvPr id="18" name="TextBox 17">
-            <a:extLst>
-              <a:ext uri="{FF2B5EF4-FFF2-40B4-BE49-F238E27FC236}">
-                <a16:creationId xmlns:a16="http://schemas.microsoft.com/office/drawing/2014/main" id="{3D1F5D53-B649-5A49-B954-8E4F85F43372}"/>
-              </a:ext>
-            </a:extLst>
-          </p:cNvPr>
-          <p:cNvSpPr txBox="1"/>
-          <p:nvPr/>
-        </p:nvSpPr>
-        <p:spPr>
-          <a:xfrm>
-            <a:off x="366959" y="3429000"/>
-            <a:ext cx="5328190" cy="369332"/>
-          </a:xfrm>
-          <a:prstGeom prst="rect">
-            <a:avLst/>
-          </a:prstGeom>
-          <a:noFill/>
-        </p:spPr>
-        <p:txBody>
-          <a:bodyPr wrap="none" rtlCol="0">
-            <a:spAutoFit/>
-          </a:bodyPr>
-          <a:lstStyle/>
-          <a:p>
-            <a:r>
-              <a:rPr lang="en-US" dirty="0"/>
-              <a:t>We solve the above problem with finite element solver</a:t>
+              <a:rPr lang="en-US" sz="1600" dirty="0"/>
+              <a:t>Reconstruction Error: 0.09860999176138388</a:t>
             </a:r>
           </a:p>
         </p:txBody>
       </p:sp>
       <p:pic>
         <p:nvPicPr>
-          <p:cNvPr id="19" name="Picture 18">
-            <a:extLst>
-              <a:ext uri="{FF2B5EF4-FFF2-40B4-BE49-F238E27FC236}">
-                <a16:creationId xmlns:a16="http://schemas.microsoft.com/office/drawing/2014/main" id="{970D3264-4919-D246-9D15-C7EDADB7E523}"/>
+          <p:cNvPr id="17" name="Picture 16">
+            <a:extLst>
+              <a:ext uri="{FF2B5EF4-FFF2-40B4-BE49-F238E27FC236}">
+                <a16:creationId xmlns:a16="http://schemas.microsoft.com/office/drawing/2014/main" id="{DEB88461-00B4-CF4E-8CB2-3EFB618270C9}"/>
               </a:ext>
             </a:extLst>
           </p:cNvPr>
@@ -7684,8 +7595,8 @@
         </p:blipFill>
         <p:spPr>
           <a:xfrm>
-            <a:off x="1093002" y="4395823"/>
-            <a:ext cx="2336800" cy="2286000"/>
+            <a:off x="4221805" y="2883861"/>
+            <a:ext cx="2495559" cy="1809280"/>
           </a:xfrm>
           <a:prstGeom prst="rect">
             <a:avLst/>
@@ -7694,10 +7605,10 @@
       </p:pic>
       <p:pic>
         <p:nvPicPr>
-          <p:cNvPr id="20" name="Picture 19">
-            <a:extLst>
-              <a:ext uri="{FF2B5EF4-FFF2-40B4-BE49-F238E27FC236}">
-                <a16:creationId xmlns:a16="http://schemas.microsoft.com/office/drawing/2014/main" id="{FCB0D9AF-08EB-2C4D-AC3C-EDE9BB3185E1}"/>
+          <p:cNvPr id="23" name="Picture 22">
+            <a:extLst>
+              <a:ext uri="{FF2B5EF4-FFF2-40B4-BE49-F238E27FC236}">
+                <a16:creationId xmlns:a16="http://schemas.microsoft.com/office/drawing/2014/main" id="{FD984DA3-CB5A-C54E-8FF9-438941019FF9}"/>
               </a:ext>
             </a:extLst>
           </p:cNvPr>
@@ -7714,20 +7625,159 @@
         </p:blipFill>
         <p:spPr>
           <a:xfrm>
-            <a:off x="3663672" y="4395823"/>
-            <a:ext cx="2273300" cy="2247900"/>
+            <a:off x="870577" y="2883860"/>
+            <a:ext cx="2621653" cy="1911440"/>
           </a:xfrm>
           <a:prstGeom prst="rect">
             <a:avLst/>
           </a:prstGeom>
         </p:spPr>
       </p:pic>
+      <p:sp>
+        <p:nvSpPr>
+          <p:cNvPr id="24" name="Rectangle 23">
+            <a:extLst>
+              <a:ext uri="{FF2B5EF4-FFF2-40B4-BE49-F238E27FC236}">
+                <a16:creationId xmlns:a16="http://schemas.microsoft.com/office/drawing/2014/main" id="{6C3ED802-F015-7843-95CE-3AAE5359D691}"/>
+              </a:ext>
+            </a:extLst>
+          </p:cNvPr>
+          <p:cNvSpPr/>
+          <p:nvPr/>
+        </p:nvSpPr>
+        <p:spPr>
+          <a:xfrm>
+            <a:off x="7023835" y="3788501"/>
+            <a:ext cx="3939155" cy="338554"/>
+          </a:xfrm>
+          <a:prstGeom prst="rect">
+            <a:avLst/>
+          </a:prstGeom>
+        </p:spPr>
+        <p:txBody>
+          <a:bodyPr wrap="none">
+            <a:spAutoFit/>
+          </a:bodyPr>
+          <a:lstStyle/>
+          <a:p>
+            <a:r>
+              <a:rPr lang="en-US" sz="1600" dirty="0"/>
+              <a:t>Reconstruction Error: 0.16966901383199118</a:t>
+            </a:r>
+          </a:p>
+        </p:txBody>
+      </p:sp>
+      <p:sp>
+        <p:nvSpPr>
+          <p:cNvPr id="25" name="TextBox 24">
+            <a:extLst>
+              <a:ext uri="{FF2B5EF4-FFF2-40B4-BE49-F238E27FC236}">
+                <a16:creationId xmlns:a16="http://schemas.microsoft.com/office/drawing/2014/main" id="{FC12410A-5A53-5440-AEA5-5B82EE33C35C}"/>
+              </a:ext>
+            </a:extLst>
+          </p:cNvPr>
+          <p:cNvSpPr txBox="1"/>
+          <p:nvPr/>
+        </p:nvSpPr>
+        <p:spPr>
+          <a:xfrm>
+            <a:off x="6995751" y="3222414"/>
+            <a:ext cx="3939155" cy="338554"/>
+          </a:xfrm>
+          <a:prstGeom prst="rect">
+            <a:avLst/>
+          </a:prstGeom>
+          <a:noFill/>
+        </p:spPr>
+        <p:txBody>
+          <a:bodyPr wrap="square" rtlCol="0">
+            <a:spAutoFit/>
+          </a:bodyPr>
+          <a:lstStyle/>
+          <a:p>
+            <a:r>
+              <a:rPr lang="en-US" sz="1600" dirty="0"/>
+              <a:t>The minimum possible of Epsilon was 0.7</a:t>
+            </a:r>
+          </a:p>
+        </p:txBody>
+      </p:sp>
+      <p:sp>
+        <p:nvSpPr>
+          <p:cNvPr id="26" name="TextBox 25">
+            <a:extLst>
+              <a:ext uri="{FF2B5EF4-FFF2-40B4-BE49-F238E27FC236}">
+                <a16:creationId xmlns:a16="http://schemas.microsoft.com/office/drawing/2014/main" id="{BD548D13-E139-1E43-AB38-4594428A6C54}"/>
+              </a:ext>
+            </a:extLst>
+          </p:cNvPr>
+          <p:cNvSpPr txBox="1"/>
+          <p:nvPr/>
+        </p:nvSpPr>
+        <p:spPr>
+          <a:xfrm>
+            <a:off x="321013" y="1410511"/>
+            <a:ext cx="399468" cy="369332"/>
+          </a:xfrm>
+          <a:prstGeom prst="rect">
+            <a:avLst/>
+          </a:prstGeom>
+          <a:noFill/>
+        </p:spPr>
+        <p:txBody>
+          <a:bodyPr wrap="none" rtlCol="0">
+            <a:spAutoFit/>
+          </a:bodyPr>
+          <a:lstStyle/>
+          <a:p>
+            <a:r>
+              <a:rPr lang="en-US" dirty="0"/>
+              <a:t>L2</a:t>
+            </a:r>
+          </a:p>
+        </p:txBody>
+      </p:sp>
+      <p:sp>
+        <p:nvSpPr>
+          <p:cNvPr id="27" name="TextBox 26">
+            <a:extLst>
+              <a:ext uri="{FF2B5EF4-FFF2-40B4-BE49-F238E27FC236}">
+                <a16:creationId xmlns:a16="http://schemas.microsoft.com/office/drawing/2014/main" id="{4687AC32-F173-0A48-96C3-91944EBB45FB}"/>
+              </a:ext>
+            </a:extLst>
+          </p:cNvPr>
+          <p:cNvSpPr txBox="1"/>
+          <p:nvPr/>
+        </p:nvSpPr>
+        <p:spPr>
+          <a:xfrm>
+            <a:off x="321013" y="3552057"/>
+            <a:ext cx="399468" cy="369332"/>
+          </a:xfrm>
+          <a:prstGeom prst="rect">
+            <a:avLst/>
+          </a:prstGeom>
+          <a:noFill/>
+        </p:spPr>
+        <p:txBody>
+          <a:bodyPr wrap="none" rtlCol="0">
+            <a:spAutoFit/>
+          </a:bodyPr>
+          <a:lstStyle/>
+          <a:p>
+            <a:r>
+              <a:rPr lang="en-US" dirty="0"/>
+              <a:t>L1</a:t>
+            </a:r>
+          </a:p>
+        </p:txBody>
+      </p:sp>
       <p:pic>
         <p:nvPicPr>
-          <p:cNvPr id="21" name="Picture 20">
-            <a:extLst>
-              <a:ext uri="{FF2B5EF4-FFF2-40B4-BE49-F238E27FC236}">
-                <a16:creationId xmlns:a16="http://schemas.microsoft.com/office/drawing/2014/main" id="{43C834D5-CDB2-AF49-9912-A2A8DF3D87CD}"/>
+          <p:cNvPr id="29" name="Picture 28">
+            <a:extLst>
+              <a:ext uri="{FF2B5EF4-FFF2-40B4-BE49-F238E27FC236}">
+                <a16:creationId xmlns:a16="http://schemas.microsoft.com/office/drawing/2014/main" id="{303ABE75-E4F6-F940-9481-FFDE94AA8CDA}"/>
               </a:ext>
             </a:extLst>
           </p:cNvPr>
@@ -7744,8 +7794,8 @@
         </p:blipFill>
         <p:spPr>
           <a:xfrm>
-            <a:off x="6170842" y="4395823"/>
-            <a:ext cx="2273300" cy="2247900"/>
+            <a:off x="4296279" y="5123692"/>
+            <a:ext cx="2346609" cy="1695237"/>
           </a:xfrm>
           <a:prstGeom prst="rect">
             <a:avLst/>
@@ -7754,10 +7804,10 @@
       </p:pic>
       <p:pic>
         <p:nvPicPr>
-          <p:cNvPr id="22" name="Picture 21">
-            <a:extLst>
-              <a:ext uri="{FF2B5EF4-FFF2-40B4-BE49-F238E27FC236}">
-                <a16:creationId xmlns:a16="http://schemas.microsoft.com/office/drawing/2014/main" id="{E575751C-F612-D949-B883-F08094434BB1}"/>
+          <p:cNvPr id="31" name="Picture 30">
+            <a:extLst>
+              <a:ext uri="{FF2B5EF4-FFF2-40B4-BE49-F238E27FC236}">
+                <a16:creationId xmlns:a16="http://schemas.microsoft.com/office/drawing/2014/main" id="{A2B283D8-B451-DE4F-91C6-79B296C33CFB}"/>
               </a:ext>
             </a:extLst>
           </p:cNvPr>
@@ -7774,18 +7824,158 @@
         </p:blipFill>
         <p:spPr>
           <a:xfrm>
-            <a:off x="8678012" y="4395823"/>
-            <a:ext cx="2247900" cy="2247900"/>
+            <a:off x="923688" y="5022992"/>
+            <a:ext cx="2568542" cy="1896638"/>
           </a:xfrm>
           <a:prstGeom prst="rect">
             <a:avLst/>
           </a:prstGeom>
         </p:spPr>
       </p:pic>
+      <p:sp>
+        <p:nvSpPr>
+          <p:cNvPr id="32" name="TextBox 31">
+            <a:extLst>
+              <a:ext uri="{FF2B5EF4-FFF2-40B4-BE49-F238E27FC236}">
+                <a16:creationId xmlns:a16="http://schemas.microsoft.com/office/drawing/2014/main" id="{1F983E7C-A9C1-D942-8A98-6428BF8FFC61}"/>
+              </a:ext>
+            </a:extLst>
+          </p:cNvPr>
+          <p:cNvSpPr txBox="1"/>
+          <p:nvPr/>
+        </p:nvSpPr>
+        <p:spPr>
+          <a:xfrm>
+            <a:off x="144307" y="5601979"/>
+            <a:ext cx="779381" cy="369332"/>
+          </a:xfrm>
+          <a:prstGeom prst="rect">
+            <a:avLst/>
+          </a:prstGeom>
+          <a:noFill/>
+        </p:spPr>
+        <p:txBody>
+          <a:bodyPr wrap="none" rtlCol="0">
+            <a:spAutoFit/>
+          </a:bodyPr>
+          <a:lstStyle/>
+          <a:p>
+            <a:r>
+              <a:rPr lang="en-US" dirty="0"/>
+              <a:t>LASSO</a:t>
+            </a:r>
+          </a:p>
+        </p:txBody>
+      </p:sp>
+      <p:sp>
+        <p:nvSpPr>
+          <p:cNvPr id="33" name="Rectangle 32">
+            <a:extLst>
+              <a:ext uri="{FF2B5EF4-FFF2-40B4-BE49-F238E27FC236}">
+                <a16:creationId xmlns:a16="http://schemas.microsoft.com/office/drawing/2014/main" id="{0EF82C53-2CCC-3740-91DF-91BF308F4506}"/>
+              </a:ext>
+            </a:extLst>
+          </p:cNvPr>
+          <p:cNvSpPr/>
+          <p:nvPr/>
+        </p:nvSpPr>
+        <p:spPr>
+          <a:xfrm>
+            <a:off x="5174216" y="5123692"/>
+            <a:ext cx="1468672" cy="338554"/>
+          </a:xfrm>
+          <a:prstGeom prst="rect">
+            <a:avLst/>
+          </a:prstGeom>
+        </p:spPr>
+        <p:txBody>
+          <a:bodyPr wrap="none">
+            <a:spAutoFit/>
+          </a:bodyPr>
+          <a:lstStyle/>
+          <a:p>
+            <a:r>
+              <a:rPr lang="en-US" sz="1600" b="0" dirty="0">
+                <a:effectLst/>
+              </a:rPr>
+              <a:t>lambda = 0.005</a:t>
+            </a:r>
+          </a:p>
+        </p:txBody>
+      </p:sp>
+      <p:sp>
+        <p:nvSpPr>
+          <p:cNvPr id="34" name="Rectangle 33">
+            <a:extLst>
+              <a:ext uri="{FF2B5EF4-FFF2-40B4-BE49-F238E27FC236}">
+                <a16:creationId xmlns:a16="http://schemas.microsoft.com/office/drawing/2014/main" id="{5D8EB579-C4B0-A641-869C-D7C1ED6CCEE7}"/>
+              </a:ext>
+            </a:extLst>
+          </p:cNvPr>
+          <p:cNvSpPr/>
+          <p:nvPr/>
+        </p:nvSpPr>
+        <p:spPr>
+          <a:xfrm>
+            <a:off x="7023835" y="5682753"/>
+            <a:ext cx="3470950" cy="307777"/>
+          </a:xfrm>
+          <a:prstGeom prst="rect">
+            <a:avLst/>
+          </a:prstGeom>
+        </p:spPr>
+        <p:txBody>
+          <a:bodyPr wrap="none">
+            <a:spAutoFit/>
+          </a:bodyPr>
+          <a:lstStyle/>
+          <a:p>
+            <a:r>
+              <a:rPr lang="en-US" sz="1400" dirty="0"/>
+              <a:t>Reconstruction Error: 0.10372515231840763</a:t>
+            </a:r>
+          </a:p>
+        </p:txBody>
+      </p:sp>
+      <p:sp>
+        <p:nvSpPr>
+          <p:cNvPr id="16" name="TextBox 15">
+            <a:extLst>
+              <a:ext uri="{FF2B5EF4-FFF2-40B4-BE49-F238E27FC236}">
+                <a16:creationId xmlns:a16="http://schemas.microsoft.com/office/drawing/2014/main" id="{29175E68-E4EB-D249-867C-A98D0099FB1E}"/>
+              </a:ext>
+            </a:extLst>
+          </p:cNvPr>
+          <p:cNvSpPr txBox="1"/>
+          <p:nvPr/>
+        </p:nvSpPr>
+        <p:spPr>
+          <a:xfrm>
+            <a:off x="21425" y="69378"/>
+            <a:ext cx="3948389" cy="400110"/>
+          </a:xfrm>
+          <a:prstGeom prst="rect">
+            <a:avLst/>
+          </a:prstGeom>
+          <a:noFill/>
+        </p:spPr>
+        <p:txBody>
+          <a:bodyPr wrap="none" rtlCol="0">
+            <a:spAutoFit/>
+          </a:bodyPr>
+          <a:lstStyle/>
+          <a:p>
+            <a:r>
+              <a:rPr lang="en-US" sz="2000" dirty="0"/>
+              <a:t>Toy problem 1: noisy measurements</a:t>
+            </a:r>
+          </a:p>
+        </p:txBody>
+      </p:sp>
     </p:spTree>
     <p:extLst>
       <p:ext uri="{BB962C8B-B14F-4D97-AF65-F5344CB8AC3E}">
-        <p14:creationId xmlns:p14="http://schemas.microsoft.com/office/powerpoint/2010/main" val="998925543"/>
+        <p14:creationId xmlns:p14="http://schemas.microsoft.com/office/powerpoint/2010/main" val="545929587"/>
       </p:ext>
     </p:extLst>
   </p:cSld>
@@ -7814,10 +8004,10 @@
       </p:grpSpPr>
       <p:pic>
         <p:nvPicPr>
-          <p:cNvPr id="3" name="Picture 2">
-            <a:extLst>
-              <a:ext uri="{FF2B5EF4-FFF2-40B4-BE49-F238E27FC236}">
-                <a16:creationId xmlns:a16="http://schemas.microsoft.com/office/drawing/2014/main" id="{041C70E5-B258-C540-8E1C-1357F56956E4}"/>
+          <p:cNvPr id="4" name="Picture 3">
+            <a:extLst>
+              <a:ext uri="{FF2B5EF4-FFF2-40B4-BE49-F238E27FC236}">
+                <a16:creationId xmlns:a16="http://schemas.microsoft.com/office/drawing/2014/main" id="{2E519EC8-71CA-D840-9C30-63E2D2BFF5E8}"/>
               </a:ext>
             </a:extLst>
           </p:cNvPr>
@@ -7834,20 +8024,55 @@
         </p:blipFill>
         <p:spPr>
           <a:xfrm>
-            <a:off x="3915947" y="2598255"/>
-            <a:ext cx="1869533" cy="1869533"/>
+            <a:off x="8711501" y="714037"/>
+            <a:ext cx="2214411" cy="2179675"/>
           </a:xfrm>
           <a:prstGeom prst="rect">
             <a:avLst/>
           </a:prstGeom>
         </p:spPr>
       </p:pic>
+      <p:sp>
+        <p:nvSpPr>
+          <p:cNvPr id="7" name="TextBox 6">
+            <a:extLst>
+              <a:ext uri="{FF2B5EF4-FFF2-40B4-BE49-F238E27FC236}">
+                <a16:creationId xmlns:a16="http://schemas.microsoft.com/office/drawing/2014/main" id="{DF922F77-F3B7-5D46-B1F0-1F1C91AE1E64}"/>
+              </a:ext>
+            </a:extLst>
+          </p:cNvPr>
+          <p:cNvSpPr txBox="1"/>
+          <p:nvPr/>
+        </p:nvSpPr>
+        <p:spPr>
+          <a:xfrm>
+            <a:off x="21425" y="69378"/>
+            <a:ext cx="5818452" cy="400110"/>
+          </a:xfrm>
+          <a:prstGeom prst="rect">
+            <a:avLst/>
+          </a:prstGeom>
+          <a:noFill/>
+        </p:spPr>
+        <p:txBody>
+          <a:bodyPr wrap="none" rtlCol="0">
+            <a:spAutoFit/>
+          </a:bodyPr>
+          <a:lstStyle/>
+          <a:p>
+            <a:r>
+              <a:rPr lang="en-US" sz="2000" dirty="0"/>
+              <a:t>Toy problem 2: heat transfer in heterogenous material</a:t>
+            </a:r>
+          </a:p>
+        </p:txBody>
+      </p:sp>
       <p:pic>
         <p:nvPicPr>
-          <p:cNvPr id="11" name="Picture 10">
-            <a:extLst>
-              <a:ext uri="{FF2B5EF4-FFF2-40B4-BE49-F238E27FC236}">
-                <a16:creationId xmlns:a16="http://schemas.microsoft.com/office/drawing/2014/main" id="{C327F4C0-73E3-C14C-9B0D-EBB396FC02EE}"/>
+          <p:cNvPr id="2" name="Picture 1">
+            <a:extLst>
+              <a:ext uri="{FF2B5EF4-FFF2-40B4-BE49-F238E27FC236}">
+                <a16:creationId xmlns:a16="http://schemas.microsoft.com/office/drawing/2014/main" id="{C07CB02C-0611-B440-9092-3A860993F645}"/>
               </a:ext>
             </a:extLst>
           </p:cNvPr>
@@ -7864,20 +8089,64 @@
         </p:blipFill>
         <p:spPr>
           <a:xfrm>
-            <a:off x="3824175" y="4678325"/>
-            <a:ext cx="1869533" cy="1886005"/>
+            <a:off x="1266088" y="1439517"/>
+            <a:ext cx="4429061" cy="728713"/>
           </a:xfrm>
           <a:prstGeom prst="rect">
             <a:avLst/>
           </a:prstGeom>
         </p:spPr>
       </p:pic>
-      <p:sp>
-        <p:nvSpPr>
-          <p:cNvPr id="4" name="TextBox 3">
-            <a:extLst>
-              <a:ext uri="{FF2B5EF4-FFF2-40B4-BE49-F238E27FC236}">
-                <a16:creationId xmlns:a16="http://schemas.microsoft.com/office/drawing/2014/main" id="{62CC6AB0-6FC9-C742-BCEA-0FF8A995BAE9}"/>
+      <p:cxnSp>
+        <p:nvCxnSpPr>
+          <p:cNvPr id="5" name="Straight Arrow Connector 4">
+            <a:extLst>
+              <a:ext uri="{FF2B5EF4-FFF2-40B4-BE49-F238E27FC236}">
+                <a16:creationId xmlns:a16="http://schemas.microsoft.com/office/drawing/2014/main" id="{3A7C893C-37A5-6444-8120-0DE7E677E340}"/>
+              </a:ext>
+            </a:extLst>
+          </p:cNvPr>
+          <p:cNvCxnSpPr>
+            <a:cxnSpLocks/>
+          </p:cNvCxnSpPr>
+          <p:nvPr/>
+        </p:nvCxnSpPr>
+        <p:spPr>
+          <a:xfrm flipH="1" flipV="1">
+            <a:off x="8133907" y="1318437"/>
+            <a:ext cx="850605" cy="340243"/>
+          </a:xfrm>
+          <a:prstGeom prst="straightConnector1">
+            <a:avLst/>
+          </a:prstGeom>
+          <a:ln w="25400">
+            <a:solidFill>
+              <a:schemeClr val="tx1"/>
+            </a:solidFill>
+            <a:tailEnd type="triangle"/>
+          </a:ln>
+        </p:spPr>
+        <p:style>
+          <a:lnRef idx="1">
+            <a:schemeClr val="accent1"/>
+          </a:lnRef>
+          <a:fillRef idx="0">
+            <a:schemeClr val="accent1"/>
+          </a:fillRef>
+          <a:effectRef idx="0">
+            <a:schemeClr val="accent1"/>
+          </a:effectRef>
+          <a:fontRef idx="minor">
+            <a:schemeClr val="tx1"/>
+          </a:fontRef>
+        </p:style>
+      </p:cxnSp>
+      <p:sp>
+        <p:nvSpPr>
+          <p:cNvPr id="13" name="TextBox 12">
+            <a:extLst>
+              <a:ext uri="{FF2B5EF4-FFF2-40B4-BE49-F238E27FC236}">
+                <a16:creationId xmlns:a16="http://schemas.microsoft.com/office/drawing/2014/main" id="{5B58523F-2788-9F4B-90AA-CF73D095E134}"/>
               </a:ext>
             </a:extLst>
           </p:cNvPr>
@@ -7886,8 +8155,8 @@
         </p:nvSpPr>
         <p:spPr>
           <a:xfrm>
-            <a:off x="203504" y="5430819"/>
-            <a:ext cx="2756076" cy="369332"/>
+            <a:off x="6944023" y="1016741"/>
+            <a:ext cx="1615186" cy="276999"/>
           </a:xfrm>
           <a:prstGeom prst="rect">
             <a:avLst/>
@@ -7901,18 +8170,62 @@
           <a:lstStyle/>
           <a:p>
             <a:r>
-              <a:rPr lang="en-US" dirty="0"/>
-              <a:t>2- Down sampled and crop </a:t>
-            </a:r>
-          </a:p>
-        </p:txBody>
-      </p:sp>
-      <p:sp>
-        <p:nvSpPr>
-          <p:cNvPr id="8" name="TextBox 7">
-            <a:extLst>
-              <a:ext uri="{FF2B5EF4-FFF2-40B4-BE49-F238E27FC236}">
-                <a16:creationId xmlns:a16="http://schemas.microsoft.com/office/drawing/2014/main" id="{C74BE216-385C-9146-B656-C67128BA1F10}"/>
+              <a:rPr lang="en-US" sz="1200" dirty="0"/>
+              <a:t>Fixed temperature to 1</a:t>
+            </a:r>
+          </a:p>
+        </p:txBody>
+      </p:sp>
+      <p:cxnSp>
+        <p:nvCxnSpPr>
+          <p:cNvPr id="14" name="Straight Arrow Connector 13">
+            <a:extLst>
+              <a:ext uri="{FF2B5EF4-FFF2-40B4-BE49-F238E27FC236}">
+                <a16:creationId xmlns:a16="http://schemas.microsoft.com/office/drawing/2014/main" id="{7E56E4D0-DC68-DE4C-96DC-BAD3583584C2}"/>
+              </a:ext>
+            </a:extLst>
+          </p:cNvPr>
+          <p:cNvCxnSpPr>
+            <a:cxnSpLocks/>
+          </p:cNvCxnSpPr>
+          <p:nvPr/>
+        </p:nvCxnSpPr>
+        <p:spPr>
+          <a:xfrm flipV="1">
+            <a:off x="10822173" y="710605"/>
+            <a:ext cx="404958" cy="478744"/>
+          </a:xfrm>
+          <a:prstGeom prst="straightConnector1">
+            <a:avLst/>
+          </a:prstGeom>
+          <a:ln w="25400">
+            <a:solidFill>
+              <a:schemeClr val="tx1"/>
+            </a:solidFill>
+            <a:tailEnd type="triangle"/>
+          </a:ln>
+        </p:spPr>
+        <p:style>
+          <a:lnRef idx="1">
+            <a:schemeClr val="accent1"/>
+          </a:lnRef>
+          <a:fillRef idx="0">
+            <a:schemeClr val="accent1"/>
+          </a:fillRef>
+          <a:effectRef idx="0">
+            <a:schemeClr val="accent1"/>
+          </a:effectRef>
+          <a:fontRef idx="minor">
+            <a:schemeClr val="tx1"/>
+          </a:fontRef>
+        </p:style>
+      </p:cxnSp>
+      <p:sp>
+        <p:nvSpPr>
+          <p:cNvPr id="16" name="TextBox 15">
+            <a:extLst>
+              <a:ext uri="{FF2B5EF4-FFF2-40B4-BE49-F238E27FC236}">
+                <a16:creationId xmlns:a16="http://schemas.microsoft.com/office/drawing/2014/main" id="{8280B503-8DBB-594D-82C8-F44E9F288FF6}"/>
               </a:ext>
             </a:extLst>
           </p:cNvPr>
@@ -7921,8 +8234,8 @@
         </p:nvSpPr>
         <p:spPr>
           <a:xfrm>
-            <a:off x="21425" y="69378"/>
-            <a:ext cx="3565528" cy="400110"/>
+            <a:off x="10576814" y="330988"/>
+            <a:ext cx="1615186" cy="276999"/>
           </a:xfrm>
           <a:prstGeom prst="rect">
             <a:avLst/>
@@ -7936,18 +8249,18 @@
           <a:lstStyle/>
           <a:p>
             <a:r>
-              <a:rPr lang="en-US" sz="2000" dirty="0"/>
-              <a:t>Toy problem 2: Data preparation</a:t>
-            </a:r>
-          </a:p>
-        </p:txBody>
-      </p:sp>
-      <p:sp>
-        <p:nvSpPr>
-          <p:cNvPr id="5" name="TextBox 4">
-            <a:extLst>
-              <a:ext uri="{FF2B5EF4-FFF2-40B4-BE49-F238E27FC236}">
-                <a16:creationId xmlns:a16="http://schemas.microsoft.com/office/drawing/2014/main" id="{A8E2949C-DFFA-C640-AF27-AD36FD633E8E}"/>
+              <a:rPr lang="en-US" sz="1200" dirty="0"/>
+              <a:t>Fixed temperature to 0</a:t>
+            </a:r>
+          </a:p>
+        </p:txBody>
+      </p:sp>
+      <p:sp>
+        <p:nvSpPr>
+          <p:cNvPr id="17" name="TextBox 16">
+            <a:extLst>
+              <a:ext uri="{FF2B5EF4-FFF2-40B4-BE49-F238E27FC236}">
+                <a16:creationId xmlns:a16="http://schemas.microsoft.com/office/drawing/2014/main" id="{109B8C76-2F74-BA40-8C2F-35F4160DD056}"/>
               </a:ext>
             </a:extLst>
           </p:cNvPr>
@@ -7956,8 +8269,8 @@
         </p:nvSpPr>
         <p:spPr>
           <a:xfrm>
-            <a:off x="157628" y="3163690"/>
-            <a:ext cx="2852832" cy="369332"/>
+            <a:off x="340241" y="832075"/>
+            <a:ext cx="3455882" cy="369332"/>
           </a:xfrm>
           <a:prstGeom prst="rect">
             <a:avLst/>
@@ -7972,17 +8285,17 @@
           <a:p>
             <a:r>
               <a:rPr lang="en-US" dirty="0"/>
-              <a:t>1- we binarized the solution </a:t>
-            </a:r>
-          </a:p>
-        </p:txBody>
-      </p:sp>
-      <p:sp>
-        <p:nvSpPr>
-          <p:cNvPr id="10" name="TextBox 9">
-            <a:extLst>
-              <a:ext uri="{FF2B5EF4-FFF2-40B4-BE49-F238E27FC236}">
-                <a16:creationId xmlns:a16="http://schemas.microsoft.com/office/drawing/2014/main" id="{EDD8CB23-6CD0-A143-8279-4727EB4169ED}"/>
+              <a:t>Governing equation: parabolic PDE</a:t>
+            </a:r>
+          </a:p>
+        </p:txBody>
+      </p:sp>
+      <p:sp>
+        <p:nvSpPr>
+          <p:cNvPr id="18" name="TextBox 17">
+            <a:extLst>
+              <a:ext uri="{FF2B5EF4-FFF2-40B4-BE49-F238E27FC236}">
+                <a16:creationId xmlns:a16="http://schemas.microsoft.com/office/drawing/2014/main" id="{3D1F5D53-B649-5A49-B954-8E4F85F43372}"/>
               </a:ext>
             </a:extLst>
           </p:cNvPr>
@@ -7991,43 +8304,8 @@
         </p:nvSpPr>
         <p:spPr>
           <a:xfrm>
-            <a:off x="9130223" y="950127"/>
-            <a:ext cx="2381293" cy="584775"/>
-          </a:xfrm>
-          <a:prstGeom prst="rect">
-            <a:avLst/>
-          </a:prstGeom>
-          <a:noFill/>
-        </p:spPr>
-        <p:txBody>
-          <a:bodyPr wrap="square" rtlCol="0">
-            <a:spAutoFit/>
-          </a:bodyPr>
-          <a:lstStyle/>
-          <a:p>
-            <a:r>
-              <a:rPr lang="en-US" sz="1600" dirty="0"/>
-              <a:t>Computational domain has a graph structure</a:t>
-            </a:r>
-          </a:p>
-        </p:txBody>
-      </p:sp>
-      <p:sp>
-        <p:nvSpPr>
-          <p:cNvPr id="13" name="TextBox 12">
-            <a:extLst>
-              <a:ext uri="{FF2B5EF4-FFF2-40B4-BE49-F238E27FC236}">
-                <a16:creationId xmlns:a16="http://schemas.microsoft.com/office/drawing/2014/main" id="{5F33CCCB-7E90-164B-891C-1D41168D9A13}"/>
-              </a:ext>
-            </a:extLst>
-          </p:cNvPr>
-          <p:cNvSpPr txBox="1"/>
-          <p:nvPr/>
-        </p:nvSpPr>
-        <p:spPr>
-          <a:xfrm>
-            <a:off x="203504" y="1057849"/>
-            <a:ext cx="2570575" cy="369332"/>
+            <a:off x="366959" y="3429000"/>
+            <a:ext cx="5328190" cy="369332"/>
           </a:xfrm>
           <a:prstGeom prst="rect">
             <a:avLst/>
@@ -8042,17 +8320,17 @@
           <a:p>
             <a:r>
               <a:rPr lang="en-US" dirty="0"/>
-              <a:t>0-field solution from FEM</a:t>
+              <a:t>We solve the above problem with finite element solver</a:t>
             </a:r>
           </a:p>
         </p:txBody>
       </p:sp>
       <p:pic>
         <p:nvPicPr>
-          <p:cNvPr id="14" name="Picture 13">
-            <a:extLst>
-              <a:ext uri="{FF2B5EF4-FFF2-40B4-BE49-F238E27FC236}">
-                <a16:creationId xmlns:a16="http://schemas.microsoft.com/office/drawing/2014/main" id="{936D074F-FCBD-F146-B045-C7D78E96CB97}"/>
+          <p:cNvPr id="19" name="Picture 18">
+            <a:extLst>
+              <a:ext uri="{FF2B5EF4-FFF2-40B4-BE49-F238E27FC236}">
+                <a16:creationId xmlns:a16="http://schemas.microsoft.com/office/drawing/2014/main" id="{970D3264-4919-D246-9D15-C7EDADB7E523}"/>
               </a:ext>
             </a:extLst>
           </p:cNvPr>
@@ -8069,71 +8347,20 @@
         </p:blipFill>
         <p:spPr>
           <a:xfrm>
-            <a:off x="4054548" y="591442"/>
-            <a:ext cx="1477147" cy="1460642"/>
+            <a:off x="1093002" y="4395823"/>
+            <a:ext cx="2336800" cy="2286000"/>
           </a:xfrm>
           <a:prstGeom prst="rect">
             <a:avLst/>
           </a:prstGeom>
         </p:spPr>
       </p:pic>
-      <p:sp>
-        <p:nvSpPr>
-          <p:cNvPr id="15" name="TextBox 14">
-            <a:extLst>
-              <a:ext uri="{FF2B5EF4-FFF2-40B4-BE49-F238E27FC236}">
-                <a16:creationId xmlns:a16="http://schemas.microsoft.com/office/drawing/2014/main" id="{F1C1B91F-C21C-4E41-832D-23EC7E2A8450}"/>
-              </a:ext>
-            </a:extLst>
-          </p:cNvPr>
-          <p:cNvSpPr txBox="1"/>
-          <p:nvPr/>
-        </p:nvSpPr>
-        <p:spPr>
-          <a:xfrm>
-            <a:off x="8150055" y="4078160"/>
-            <a:ext cx="3618614" cy="1200329"/>
-          </a:xfrm>
-          <a:prstGeom prst="rect">
-            <a:avLst/>
-          </a:prstGeom>
-          <a:noFill/>
-        </p:spPr>
-        <p:txBody>
-          <a:bodyPr wrap="square" rtlCol="0">
-            <a:spAutoFit/>
-          </a:bodyPr>
-          <a:lstStyle/>
-          <a:p>
-            <a:pPr algn="ctr"/>
-            <a:r>
-              <a:rPr lang="en-US" sz="2400" dirty="0">
-                <a:solidFill>
-                  <a:srgbClr val="00B0F0"/>
-                </a:solidFill>
-              </a:rPr>
-              <a:t>To be as close as possible to experimental </a:t>
-            </a:r>
-          </a:p>
-          <a:p>
-            <a:pPr algn="ctr"/>
-            <a:r>
-              <a:rPr lang="en-US" sz="2400" dirty="0">
-                <a:solidFill>
-                  <a:srgbClr val="00B0F0"/>
-                </a:solidFill>
-              </a:rPr>
-              <a:t>conditions!</a:t>
-            </a:r>
-          </a:p>
-        </p:txBody>
-      </p:sp>
       <p:pic>
         <p:nvPicPr>
-          <p:cNvPr id="17" name="Picture 16">
-            <a:extLst>
-              <a:ext uri="{FF2B5EF4-FFF2-40B4-BE49-F238E27FC236}">
-                <a16:creationId xmlns:a16="http://schemas.microsoft.com/office/drawing/2014/main" id="{3F05394D-B945-8C41-90CC-268D696D2433}"/>
+          <p:cNvPr id="20" name="Picture 19">
+            <a:extLst>
+              <a:ext uri="{FF2B5EF4-FFF2-40B4-BE49-F238E27FC236}">
+                <a16:creationId xmlns:a16="http://schemas.microsoft.com/office/drawing/2014/main" id="{FCB0D9AF-08EB-2C4D-AC3C-EDE9BB3185E1}"/>
               </a:ext>
             </a:extLst>
           </p:cNvPr>
@@ -8150,8 +8377,68 @@
         </p:blipFill>
         <p:spPr>
           <a:xfrm>
-            <a:off x="6438405" y="373191"/>
-            <a:ext cx="2691818" cy="1859647"/>
+            <a:off x="3663672" y="4395823"/>
+            <a:ext cx="2273300" cy="2247900"/>
+          </a:xfrm>
+          <a:prstGeom prst="rect">
+            <a:avLst/>
+          </a:prstGeom>
+        </p:spPr>
+      </p:pic>
+      <p:pic>
+        <p:nvPicPr>
+          <p:cNvPr id="21" name="Picture 20">
+            <a:extLst>
+              <a:ext uri="{FF2B5EF4-FFF2-40B4-BE49-F238E27FC236}">
+                <a16:creationId xmlns:a16="http://schemas.microsoft.com/office/drawing/2014/main" id="{43C834D5-CDB2-AF49-9912-A2A8DF3D87CD}"/>
+              </a:ext>
+            </a:extLst>
+          </p:cNvPr>
+          <p:cNvPicPr>
+            <a:picLocks noChangeAspect="1"/>
+          </p:cNvPicPr>
+          <p:nvPr/>
+        </p:nvPicPr>
+        <p:blipFill>
+          <a:blip r:embed="rId6"/>
+          <a:stretch>
+            <a:fillRect/>
+          </a:stretch>
+        </p:blipFill>
+        <p:spPr>
+          <a:xfrm>
+            <a:off x="6170842" y="4395823"/>
+            <a:ext cx="2273300" cy="2247900"/>
+          </a:xfrm>
+          <a:prstGeom prst="rect">
+            <a:avLst/>
+          </a:prstGeom>
+        </p:spPr>
+      </p:pic>
+      <p:pic>
+        <p:nvPicPr>
+          <p:cNvPr id="22" name="Picture 21">
+            <a:extLst>
+              <a:ext uri="{FF2B5EF4-FFF2-40B4-BE49-F238E27FC236}">
+                <a16:creationId xmlns:a16="http://schemas.microsoft.com/office/drawing/2014/main" id="{E575751C-F612-D949-B883-F08094434BB1}"/>
+              </a:ext>
+            </a:extLst>
+          </p:cNvPr>
+          <p:cNvPicPr>
+            <a:picLocks noChangeAspect="1"/>
+          </p:cNvPicPr>
+          <p:nvPr/>
+        </p:nvPicPr>
+        <p:blipFill>
+          <a:blip r:embed="rId7"/>
+          <a:stretch>
+            <a:fillRect/>
+          </a:stretch>
+        </p:blipFill>
+        <p:spPr>
+          <a:xfrm>
+            <a:off x="8678012" y="4395823"/>
+            <a:ext cx="2247900" cy="2247900"/>
           </a:xfrm>
           <a:prstGeom prst="rect">
             <a:avLst/>
@@ -8161,7 +8448,7 @@
     </p:spTree>
     <p:extLst>
       <p:ext uri="{BB962C8B-B14F-4D97-AF65-F5344CB8AC3E}">
-        <p14:creationId xmlns:p14="http://schemas.microsoft.com/office/powerpoint/2010/main" val="968249077"/>
+        <p14:creationId xmlns:p14="http://schemas.microsoft.com/office/powerpoint/2010/main" val="998925543"/>
       </p:ext>
     </p:extLst>
   </p:cSld>
@@ -8188,161 +8475,40 @@
           <a:chExt cx="0" cy="0"/>
         </a:xfrm>
       </p:grpSpPr>
-      <p:grpSp>
-        <p:nvGrpSpPr>
-          <p:cNvPr id="9" name="Group 8">
-            <a:extLst>
-              <a:ext uri="{FF2B5EF4-FFF2-40B4-BE49-F238E27FC236}">
-                <a16:creationId xmlns:a16="http://schemas.microsoft.com/office/drawing/2014/main" id="{3F1EC9CF-4A60-0946-92F8-8701F839464A}"/>
-              </a:ext>
-            </a:extLst>
-          </p:cNvPr>
-          <p:cNvGrpSpPr/>
-          <p:nvPr/>
-        </p:nvGrpSpPr>
-        <p:grpSpPr>
-          <a:xfrm>
-            <a:off x="1055162" y="1446028"/>
-            <a:ext cx="7004365" cy="3748973"/>
-            <a:chOff x="1055162" y="1446028"/>
-            <a:chExt cx="7004365" cy="3748973"/>
-          </a:xfrm>
-        </p:grpSpPr>
-        <p:pic>
-          <p:nvPicPr>
-            <p:cNvPr id="5" name="Picture 4">
-              <a:extLst>
-                <a:ext uri="{FF2B5EF4-FFF2-40B4-BE49-F238E27FC236}">
-                  <a16:creationId xmlns:a16="http://schemas.microsoft.com/office/drawing/2014/main" id="{B2F659E0-37DC-9542-A4B4-50F9D97B8D5E}"/>
-                </a:ext>
-              </a:extLst>
-            </p:cNvPr>
-            <p:cNvPicPr>
-              <a:picLocks noChangeAspect="1"/>
-            </p:cNvPicPr>
-            <p:nvPr/>
-          </p:nvPicPr>
-          <p:blipFill>
-            <a:blip r:embed="rId2"/>
-            <a:stretch>
-              <a:fillRect/>
-            </a:stretch>
-          </p:blipFill>
-          <p:spPr>
-            <a:xfrm>
-              <a:off x="4709402" y="1446028"/>
-              <a:ext cx="3350125" cy="3379641"/>
-            </a:xfrm>
-            <a:prstGeom prst="rect">
-              <a:avLst/>
-            </a:prstGeom>
-          </p:spPr>
-        </p:pic>
-        <p:pic>
-          <p:nvPicPr>
-            <p:cNvPr id="6" name="Picture 5">
-              <a:extLst>
-                <a:ext uri="{FF2B5EF4-FFF2-40B4-BE49-F238E27FC236}">
-                  <a16:creationId xmlns:a16="http://schemas.microsoft.com/office/drawing/2014/main" id="{27A92E49-04FA-CD44-9FDE-8866746090B3}"/>
-                </a:ext>
-              </a:extLst>
-            </p:cNvPr>
-            <p:cNvPicPr>
-              <a:picLocks noChangeAspect="1"/>
-            </p:cNvPicPr>
-            <p:nvPr/>
-          </p:nvPicPr>
-          <p:blipFill>
-            <a:blip r:embed="rId3"/>
-            <a:stretch>
-              <a:fillRect/>
-            </a:stretch>
-          </p:blipFill>
-          <p:spPr>
-            <a:xfrm>
-              <a:off x="1055162" y="1605516"/>
-              <a:ext cx="3256540" cy="3220153"/>
-            </a:xfrm>
-            <a:prstGeom prst="rect">
-              <a:avLst/>
-            </a:prstGeom>
-          </p:spPr>
-        </p:pic>
-        <p:sp>
-          <p:nvSpPr>
-            <p:cNvPr id="7" name="TextBox 6">
-              <a:extLst>
-                <a:ext uri="{FF2B5EF4-FFF2-40B4-BE49-F238E27FC236}">
-                  <a16:creationId xmlns:a16="http://schemas.microsoft.com/office/drawing/2014/main" id="{B3A703C3-C5B2-7F42-8942-D3C69759E1E0}"/>
-                </a:ext>
-              </a:extLst>
-            </p:cNvPr>
-            <p:cNvSpPr txBox="1"/>
-            <p:nvPr/>
-          </p:nvSpPr>
-          <p:spPr>
-            <a:xfrm>
-              <a:off x="2358938" y="4825669"/>
-              <a:ext cx="436338" cy="369332"/>
-            </a:xfrm>
-            <a:prstGeom prst="rect">
-              <a:avLst/>
-            </a:prstGeom>
-            <a:noFill/>
-          </p:spPr>
-          <p:txBody>
-            <a:bodyPr wrap="none" rtlCol="0">
-              <a:spAutoFit/>
-            </a:bodyPr>
-            <a:lstStyle/>
-            <a:p>
-              <a:r>
-                <a:rPr lang="en-US" dirty="0"/>
-                <a:t>(a)</a:t>
-              </a:r>
-            </a:p>
-          </p:txBody>
-        </p:sp>
-        <p:sp>
-          <p:nvSpPr>
-            <p:cNvPr id="8" name="TextBox 7">
-              <a:extLst>
-                <a:ext uri="{FF2B5EF4-FFF2-40B4-BE49-F238E27FC236}">
-                  <a16:creationId xmlns:a16="http://schemas.microsoft.com/office/drawing/2014/main" id="{F3BF3CE6-DC46-C64A-A432-3514D6480284}"/>
-                </a:ext>
-              </a:extLst>
-            </p:cNvPr>
-            <p:cNvSpPr txBox="1"/>
-            <p:nvPr/>
-          </p:nvSpPr>
-          <p:spPr>
-            <a:xfrm>
-              <a:off x="6384464" y="4825669"/>
-              <a:ext cx="447558" cy="369332"/>
-            </a:xfrm>
-            <a:prstGeom prst="rect">
-              <a:avLst/>
-            </a:prstGeom>
-            <a:noFill/>
-          </p:spPr>
-          <p:txBody>
-            <a:bodyPr wrap="none" rtlCol="0">
-              <a:spAutoFit/>
-            </a:bodyPr>
-            <a:lstStyle/>
-            <a:p>
-              <a:r>
-                <a:rPr lang="en-US" dirty="0"/>
-                <a:t>(b)</a:t>
-              </a:r>
-            </a:p>
-          </p:txBody>
-        </p:sp>
-      </p:grpSp>
+      <p:pic>
+        <p:nvPicPr>
+          <p:cNvPr id="4" name="Picture 3">
+            <a:extLst>
+              <a:ext uri="{FF2B5EF4-FFF2-40B4-BE49-F238E27FC236}">
+                <a16:creationId xmlns:a16="http://schemas.microsoft.com/office/drawing/2014/main" id="{6DD4221C-6A9D-1847-9B81-4877AD818F1D}"/>
+              </a:ext>
+            </a:extLst>
+          </p:cNvPr>
+          <p:cNvPicPr>
+            <a:picLocks noChangeAspect="1"/>
+          </p:cNvPicPr>
+          <p:nvPr/>
+        </p:nvPicPr>
+        <p:blipFill>
+          <a:blip r:embed="rId2"/>
+          <a:stretch>
+            <a:fillRect/>
+          </a:stretch>
+        </p:blipFill>
+        <p:spPr>
+          <a:xfrm>
+            <a:off x="3085251" y="1058283"/>
+            <a:ext cx="4105238" cy="4040842"/>
+          </a:xfrm>
+          <a:prstGeom prst="rect">
+            <a:avLst/>
+          </a:prstGeom>
+        </p:spPr>
+      </p:pic>
     </p:spTree>
     <p:extLst>
       <p:ext uri="{BB962C8B-B14F-4D97-AF65-F5344CB8AC3E}">
-        <p14:creationId xmlns:p14="http://schemas.microsoft.com/office/powerpoint/2010/main" val="3454847941"/>
+        <p14:creationId xmlns:p14="http://schemas.microsoft.com/office/powerpoint/2010/main" val="1467505426"/>
       </p:ext>
     </p:extLst>
   </p:cSld>

</xml_diff>